<commit_message>
Preparation exam - JQuery
</commit_message>
<xml_diff>
--- a/JS-Advanced/LecturesAndExercises-Conditions/03.jQuery.pptx
+++ b/JS-Advanced/LecturesAndExercises-Conditions/03.jQuery.pptx
@@ -239,7 +239,7 @@
       </p14:sectionLst>
     </p:ext>
     <p:ext uri="{EFAFB233-063F-42B5-8137-9DF3F51BA10A}">
-      <p15:sldGuideLst xmlns:p15="http://schemas.microsoft.com/office/powerpoint/2012/main" xmlns="">
+      <p15:sldGuideLst xmlns:p15="http://schemas.microsoft.com/office/powerpoint/2012/main">
         <p15:guide id="1" orient="horz" pos="2160" userDrawn="1">
           <p15:clr>
             <a:srgbClr val="A4A3A4"/>
@@ -253,7 +253,7 @@
       </p15:sldGuideLst>
     </p:ext>
     <p:ext uri="{2D200454-40CA-4A62-9FC3-DE9A4176ACB9}">
-      <p15:notesGuideLst xmlns:p15="http://schemas.microsoft.com/office/powerpoint/2012/main" xmlns="">
+      <p15:notesGuideLst xmlns:p15="http://schemas.microsoft.com/office/powerpoint/2012/main">
         <p15:guide id="1" orient="horz" pos="2880">
           <p15:clr>
             <a:srgbClr val="A4A3A4"/>
@@ -353,7 +353,7 @@
             <a:fld id="{FE5B4EDC-59C0-49C7-8ADA-5A781B329E02}" type="datetimeFigureOut">
               <a:rPr lang="en-US"/>
               <a:pPr/>
-              <a:t>9/19/2018</a:t>
+              <a:t>11/11/2018</a:t>
             </a:fld>
             <a:endParaRPr dirty="0"/>
           </a:p>
@@ -552,7 +552,7 @@
             <a:fld id="{F2D8D46A-B586-417D-BFBD-8C8FE0AAF762}" type="datetimeFigureOut">
               <a:rPr lang="en-US" smtClean="0"/>
               <a:pPr/>
-              <a:t>9/19/2018</a:t>
+              <a:t>11/11/2018</a:t>
             </a:fld>
             <a:endParaRPr lang="en-US"/>
           </a:p>
@@ -1862,7 +1862,7 @@
           <p:cNvPr id="17" name="Picture 16">
             <a:extLst>
               <a:ext uri="{FF2B5EF4-FFF2-40B4-BE49-F238E27FC236}">
-                <a16:creationId xmlns="" xmlns:a16="http://schemas.microsoft.com/office/drawing/2014/main" id="{5B5A345C-2CD0-4932-A998-37B2D20BF028}"/>
+                <a16:creationId xmlns:a16="http://schemas.microsoft.com/office/drawing/2014/main" id="{5B5A345C-2CD0-4932-A998-37B2D20BF028}"/>
               </a:ext>
             </a:extLst>
           </p:cNvPr>
@@ -1891,7 +1891,7 @@
           <p:cNvPr id="33" name="Picture Placeholder 32">
             <a:extLst>
               <a:ext uri="{FF2B5EF4-FFF2-40B4-BE49-F238E27FC236}">
-                <a16:creationId xmlns="" xmlns:a16="http://schemas.microsoft.com/office/drawing/2014/main" id="{A04D819A-89E2-4714-8C56-1838BF467EF7}"/>
+                <a16:creationId xmlns:a16="http://schemas.microsoft.com/office/drawing/2014/main" id="{A04D819A-89E2-4714-8C56-1838BF467EF7}"/>
               </a:ext>
             </a:extLst>
           </p:cNvPr>
@@ -1934,7 +1934,7 @@
           <p:cNvPr id="35" name="Picture 34">
             <a:extLst>
               <a:ext uri="{FF2B5EF4-FFF2-40B4-BE49-F238E27FC236}">
-                <a16:creationId xmlns="" xmlns:a16="http://schemas.microsoft.com/office/drawing/2014/main" id="{951E7DA9-C5F0-43D9-B013-3BDF9EEF029D}"/>
+                <a16:creationId xmlns:a16="http://schemas.microsoft.com/office/drawing/2014/main" id="{951E7DA9-C5F0-43D9-B013-3BDF9EEF029D}"/>
               </a:ext>
             </a:extLst>
           </p:cNvPr>
@@ -1969,7 +1969,7 @@
           <p:cNvPr id="43" name="Subtitle 5">
             <a:extLst>
               <a:ext uri="{FF2B5EF4-FFF2-40B4-BE49-F238E27FC236}">
-                <a16:creationId xmlns="" xmlns:a16="http://schemas.microsoft.com/office/drawing/2014/main" id="{37BDB812-1395-4B02-ABCF-6A331EEE23E5}"/>
+                <a16:creationId xmlns:a16="http://schemas.microsoft.com/office/drawing/2014/main" id="{37BDB812-1395-4B02-ABCF-6A331EEE23E5}"/>
               </a:ext>
             </a:extLst>
           </p:cNvPr>
@@ -2017,7 +2017,7 @@
           <p:cNvPr id="19" name="Picture 18">
             <a:extLst>
               <a:ext uri="{FF2B5EF4-FFF2-40B4-BE49-F238E27FC236}">
-                <a16:creationId xmlns="" xmlns:a16="http://schemas.microsoft.com/office/drawing/2014/main" id="{4FAEB7CD-FF73-4344-9FE5-589B30F5AAF7}"/>
+                <a16:creationId xmlns:a16="http://schemas.microsoft.com/office/drawing/2014/main" id="{4FAEB7CD-FF73-4344-9FE5-589B30F5AAF7}"/>
               </a:ext>
             </a:extLst>
           </p:cNvPr>
@@ -2053,7 +2053,7 @@
           <p:cNvPr id="10" name="Picture 9">
             <a:extLst>
               <a:ext uri="{FF2B5EF4-FFF2-40B4-BE49-F238E27FC236}">
-                <a16:creationId xmlns="" xmlns:a16="http://schemas.microsoft.com/office/drawing/2014/main" id="{82DFEC2C-38C6-405B-AD0A-06879C50EFEE}"/>
+                <a16:creationId xmlns:a16="http://schemas.microsoft.com/office/drawing/2014/main" id="{82DFEC2C-38C6-405B-AD0A-06879C50EFEE}"/>
               </a:ext>
             </a:extLst>
           </p:cNvPr>
@@ -2088,7 +2088,7 @@
           <p:cNvPr id="15" name="Picture 14">
             <a:extLst>
               <a:ext uri="{FF2B5EF4-FFF2-40B4-BE49-F238E27FC236}">
-                <a16:creationId xmlns="" xmlns:a16="http://schemas.microsoft.com/office/drawing/2014/main" id="{D7483B54-1DD1-4FC4-9FA0-4872F8C409C8}"/>
+                <a16:creationId xmlns:a16="http://schemas.microsoft.com/office/drawing/2014/main" id="{D7483B54-1DD1-4FC4-9FA0-4872F8C409C8}"/>
               </a:ext>
             </a:extLst>
           </p:cNvPr>
@@ -2123,7 +2123,7 @@
           <p:cNvPr id="2" name="Title 1">
             <a:extLst>
               <a:ext uri="{FF2B5EF4-FFF2-40B4-BE49-F238E27FC236}">
-                <a16:creationId xmlns="" xmlns:a16="http://schemas.microsoft.com/office/drawing/2014/main" id="{A4DF3AB8-E6E3-4FCE-8A4A-ECD147720A5D}"/>
+                <a16:creationId xmlns:a16="http://schemas.microsoft.com/office/drawing/2014/main" id="{A4DF3AB8-E6E3-4FCE-8A4A-ECD147720A5D}"/>
               </a:ext>
             </a:extLst>
           </p:cNvPr>
@@ -2161,7 +2161,7 @@
             <a:hlinkClick r:id="rId7" tooltip="This work is licensed under the &quot;Creative Commons Attribution-NonCommercial-ShareAlike 4.0 International&quot; license"/>
             <a:extLst>
               <a:ext uri="{FF2B5EF4-FFF2-40B4-BE49-F238E27FC236}">
-                <a16:creationId xmlns="" xmlns:a16="http://schemas.microsoft.com/office/drawing/2014/main" id="{7CB336FF-A768-4CE1-B1CE-FC103B348EA1}"/>
+                <a16:creationId xmlns:a16="http://schemas.microsoft.com/office/drawing/2014/main" id="{7CB336FF-A768-4CE1-B1CE-FC103B348EA1}"/>
               </a:ext>
             </a:extLst>
           </p:cNvPr>
@@ -2214,7 +2214,7 @@
           <p:cNvPr id="30" name="Text Placeholder 13">
             <a:extLst>
               <a:ext uri="{FF2B5EF4-FFF2-40B4-BE49-F238E27FC236}">
-                <a16:creationId xmlns="" xmlns:a16="http://schemas.microsoft.com/office/drawing/2014/main" id="{2EA92DCA-4DB5-4D03-ACD3-A6A296592D0C}"/>
+                <a16:creationId xmlns:a16="http://schemas.microsoft.com/office/drawing/2014/main" id="{2EA92DCA-4DB5-4D03-ACD3-A6A296592D0C}"/>
               </a:ext>
             </a:extLst>
           </p:cNvPr>
@@ -2276,7 +2276,7 @@
           <p:cNvPr id="31" name="Text Placeholder 13">
             <a:extLst>
               <a:ext uri="{FF2B5EF4-FFF2-40B4-BE49-F238E27FC236}">
-                <a16:creationId xmlns="" xmlns:a16="http://schemas.microsoft.com/office/drawing/2014/main" id="{3E6B87B7-9D33-4EBB-BD4F-C0436BA3FD72}"/>
+                <a16:creationId xmlns:a16="http://schemas.microsoft.com/office/drawing/2014/main" id="{3E6B87B7-9D33-4EBB-BD4F-C0436BA3FD72}"/>
               </a:ext>
             </a:extLst>
           </p:cNvPr>
@@ -2338,7 +2338,7 @@
           <p:cNvPr id="36" name="Text Placeholder 13">
             <a:extLst>
               <a:ext uri="{FF2B5EF4-FFF2-40B4-BE49-F238E27FC236}">
-                <a16:creationId xmlns="" xmlns:a16="http://schemas.microsoft.com/office/drawing/2014/main" id="{3B21F47B-DE1F-442D-A2B7-6866F8786704}"/>
+                <a16:creationId xmlns:a16="http://schemas.microsoft.com/office/drawing/2014/main" id="{3B21F47B-DE1F-442D-A2B7-6866F8786704}"/>
               </a:ext>
             </a:extLst>
           </p:cNvPr>
@@ -2398,7 +2398,7 @@
           <p:cNvPr id="40" name="Text Placeholder 13">
             <a:extLst>
               <a:ext uri="{FF2B5EF4-FFF2-40B4-BE49-F238E27FC236}">
-                <a16:creationId xmlns="" xmlns:a16="http://schemas.microsoft.com/office/drawing/2014/main" id="{CD940256-851E-46C8-8BFB-A5ECA6C7DA07}"/>
+                <a16:creationId xmlns:a16="http://schemas.microsoft.com/office/drawing/2014/main" id="{CD940256-851E-46C8-8BFB-A5ECA6C7DA07}"/>
               </a:ext>
             </a:extLst>
           </p:cNvPr>
@@ -2458,7 +2458,7 @@
           <p:cNvPr id="16" name="Rectangle 15">
             <a:extLst>
               <a:ext uri="{FF2B5EF4-FFF2-40B4-BE49-F238E27FC236}">
-                <a16:creationId xmlns="" xmlns:a16="http://schemas.microsoft.com/office/drawing/2014/main" id="{6854D183-0374-4B3E-B2CE-32F308A81591}"/>
+                <a16:creationId xmlns:a16="http://schemas.microsoft.com/office/drawing/2014/main" id="{6854D183-0374-4B3E-B2CE-32F308A81591}"/>
               </a:ext>
             </a:extLst>
           </p:cNvPr>
@@ -2539,7 +2539,7 @@
           <p:cNvPr id="18" name="Rectangle 17">
             <a:extLst>
               <a:ext uri="{FF2B5EF4-FFF2-40B4-BE49-F238E27FC236}">
-                <a16:creationId xmlns="" xmlns:a16="http://schemas.microsoft.com/office/drawing/2014/main" id="{34E5CD64-8E62-478C-BD07-29B0AE8E261B}"/>
+                <a16:creationId xmlns:a16="http://schemas.microsoft.com/office/drawing/2014/main" id="{34E5CD64-8E62-478C-BD07-29B0AE8E261B}"/>
               </a:ext>
             </a:extLst>
           </p:cNvPr>
@@ -2635,7 +2635,7 @@
   </mc:AlternateContent>
   <p:extLst mod="1">
     <p:ext uri="{DCECCB84-F9BA-43D5-87BE-67443E8EF086}">
-      <p15:sldGuideLst xmlns:p15="http://schemas.microsoft.com/office/powerpoint/2012/main" xmlns="">
+      <p15:sldGuideLst xmlns:p15="http://schemas.microsoft.com/office/powerpoint/2012/main">
         <p15:guide id="1" orient="horz" pos="2160">
           <p15:clr>
             <a:srgbClr val="FBAE40"/>
@@ -2674,7 +2674,7 @@
           <p:cNvPr id="11" name="Picture 10">
             <a:extLst>
               <a:ext uri="{FF2B5EF4-FFF2-40B4-BE49-F238E27FC236}">
-                <a16:creationId xmlns="" xmlns:a16="http://schemas.microsoft.com/office/drawing/2014/main" id="{23609A8D-9063-4A88-A094-81A65D7DF417}"/>
+                <a16:creationId xmlns:a16="http://schemas.microsoft.com/office/drawing/2014/main" id="{23609A8D-9063-4A88-A094-81A65D7DF417}"/>
               </a:ext>
             </a:extLst>
           </p:cNvPr>
@@ -2703,7 +2703,7 @@
           <p:cNvPr id="17" name="Rectangle 16">
             <a:extLst>
               <a:ext uri="{FF2B5EF4-FFF2-40B4-BE49-F238E27FC236}">
-                <a16:creationId xmlns="" xmlns:a16="http://schemas.microsoft.com/office/drawing/2014/main" id="{4880F1A8-532C-4443-BDB9-44438A972E15}"/>
+                <a16:creationId xmlns:a16="http://schemas.microsoft.com/office/drawing/2014/main" id="{4880F1A8-532C-4443-BDB9-44438A972E15}"/>
               </a:ext>
             </a:extLst>
           </p:cNvPr>
@@ -3013,7 +3013,7 @@
           <p:cNvPr id="10" name="Rectangle 9">
             <a:extLst>
               <a:ext uri="{FF2B5EF4-FFF2-40B4-BE49-F238E27FC236}">
-                <a16:creationId xmlns="" xmlns:a16="http://schemas.microsoft.com/office/drawing/2014/main" id="{E9B994EC-35A8-4A11-98CB-25DC28852F94}"/>
+                <a16:creationId xmlns:a16="http://schemas.microsoft.com/office/drawing/2014/main" id="{E9B994EC-35A8-4A11-98CB-25DC28852F94}"/>
               </a:ext>
             </a:extLst>
           </p:cNvPr>
@@ -3094,7 +3094,7 @@
           <p:cNvPr id="14" name="Text Placeholder 13">
             <a:extLst>
               <a:ext uri="{FF2B5EF4-FFF2-40B4-BE49-F238E27FC236}">
-                <a16:creationId xmlns="" xmlns:a16="http://schemas.microsoft.com/office/drawing/2014/main" id="{A2ABE920-240F-4CF6-AD45-23ED489FAD6E}"/>
+                <a16:creationId xmlns:a16="http://schemas.microsoft.com/office/drawing/2014/main" id="{A2ABE920-240F-4CF6-AD45-23ED489FAD6E}"/>
               </a:ext>
             </a:extLst>
           </p:cNvPr>
@@ -3157,7 +3157,7 @@
           <p:cNvPr id="6" name="Title 5">
             <a:extLst>
               <a:ext uri="{FF2B5EF4-FFF2-40B4-BE49-F238E27FC236}">
-                <a16:creationId xmlns="" xmlns:a16="http://schemas.microsoft.com/office/drawing/2014/main" id="{2FF342A0-26CC-4ADA-AB90-FC4810F88E91}"/>
+                <a16:creationId xmlns:a16="http://schemas.microsoft.com/office/drawing/2014/main" id="{2FF342A0-26CC-4ADA-AB90-FC4810F88E91}"/>
               </a:ext>
             </a:extLst>
           </p:cNvPr>
@@ -3193,7 +3193,7 @@
           <p:cNvPr id="8" name="Date Placeholder 7">
             <a:extLst>
               <a:ext uri="{FF2B5EF4-FFF2-40B4-BE49-F238E27FC236}">
-                <a16:creationId xmlns="" xmlns:a16="http://schemas.microsoft.com/office/drawing/2014/main" id="{A66184F8-77F5-4000-AA69-383B07AEEF0D}"/>
+                <a16:creationId xmlns:a16="http://schemas.microsoft.com/office/drawing/2014/main" id="{A66184F8-77F5-4000-AA69-383B07AEEF0D}"/>
               </a:ext>
             </a:extLst>
           </p:cNvPr>
@@ -3218,7 +3218,7 @@
           <p:cNvPr id="9" name="Footer Placeholder 8">
             <a:extLst>
               <a:ext uri="{FF2B5EF4-FFF2-40B4-BE49-F238E27FC236}">
-                <a16:creationId xmlns="" xmlns:a16="http://schemas.microsoft.com/office/drawing/2014/main" id="{9CAD63B7-3B55-42B3-B63C-7488630C399B}"/>
+                <a16:creationId xmlns:a16="http://schemas.microsoft.com/office/drawing/2014/main" id="{9CAD63B7-3B55-42B3-B63C-7488630C399B}"/>
               </a:ext>
             </a:extLst>
           </p:cNvPr>
@@ -3243,7 +3243,7 @@
           <p:cNvPr id="15" name="Slide Number Placeholder 14">
             <a:extLst>
               <a:ext uri="{FF2B5EF4-FFF2-40B4-BE49-F238E27FC236}">
-                <a16:creationId xmlns="" xmlns:a16="http://schemas.microsoft.com/office/drawing/2014/main" id="{97A1733E-05EA-4892-9222-96356ACBDF86}"/>
+                <a16:creationId xmlns:a16="http://schemas.microsoft.com/office/drawing/2014/main" id="{97A1733E-05EA-4892-9222-96356ACBDF86}"/>
               </a:ext>
             </a:extLst>
           </p:cNvPr>
@@ -3273,7 +3273,7 @@
           <p:cNvPr id="16" name="Picture 15">
             <a:extLst>
               <a:ext uri="{FF2B5EF4-FFF2-40B4-BE49-F238E27FC236}">
-                <a16:creationId xmlns="" xmlns:a16="http://schemas.microsoft.com/office/drawing/2014/main" id="{2FE050E4-DC54-4CF4-A8D3-DC8B8DA04ECB}"/>
+                <a16:creationId xmlns:a16="http://schemas.microsoft.com/office/drawing/2014/main" id="{2FE050E4-DC54-4CF4-A8D3-DC8B8DA04ECB}"/>
               </a:ext>
             </a:extLst>
           </p:cNvPr>
@@ -3309,7 +3309,7 @@
           <p:cNvPr id="18" name="Rectangle 17">
             <a:extLst>
               <a:ext uri="{FF2B5EF4-FFF2-40B4-BE49-F238E27FC236}">
-                <a16:creationId xmlns="" xmlns:a16="http://schemas.microsoft.com/office/drawing/2014/main" id="{B2B94D3F-5DC8-4398-914C-4833ABE4CC19}"/>
+                <a16:creationId xmlns:a16="http://schemas.microsoft.com/office/drawing/2014/main" id="{B2B94D3F-5DC8-4398-914C-4833ABE4CC19}"/>
               </a:ext>
             </a:extLst>
           </p:cNvPr>
@@ -3436,7 +3436,7 @@
           <p:cNvPr id="36" name="Picture 35">
             <a:extLst>
               <a:ext uri="{FF2B5EF4-FFF2-40B4-BE49-F238E27FC236}">
-                <a16:creationId xmlns="" xmlns:a16="http://schemas.microsoft.com/office/drawing/2014/main" id="{B21D9C95-5FF6-4F7E-AC00-ED6F3DD385F0}"/>
+                <a16:creationId xmlns:a16="http://schemas.microsoft.com/office/drawing/2014/main" id="{B21D9C95-5FF6-4F7E-AC00-ED6F3DD385F0}"/>
               </a:ext>
             </a:extLst>
           </p:cNvPr>
@@ -3465,7 +3465,7 @@
           <p:cNvPr id="56" name="Picture 55">
             <a:extLst>
               <a:ext uri="{FF2B5EF4-FFF2-40B4-BE49-F238E27FC236}">
-                <a16:creationId xmlns="" xmlns:a16="http://schemas.microsoft.com/office/drawing/2014/main" id="{DEAD13D1-8921-41EB-9EDF-DA3F5121F449}"/>
+                <a16:creationId xmlns:a16="http://schemas.microsoft.com/office/drawing/2014/main" id="{DEAD13D1-8921-41EB-9EDF-DA3F5121F449}"/>
               </a:ext>
             </a:extLst>
           </p:cNvPr>
@@ -3494,7 +3494,7 @@
           <p:cNvPr id="19" name="Rectangle 18">
             <a:extLst>
               <a:ext uri="{FF2B5EF4-FFF2-40B4-BE49-F238E27FC236}">
-                <a16:creationId xmlns="" xmlns:a16="http://schemas.microsoft.com/office/drawing/2014/main" id="{7CFDBB16-985C-4CC7-B6DB-B81B36037922}"/>
+                <a16:creationId xmlns:a16="http://schemas.microsoft.com/office/drawing/2014/main" id="{7CFDBB16-985C-4CC7-B6DB-B81B36037922}"/>
               </a:ext>
             </a:extLst>
           </p:cNvPr>
@@ -3593,7 +3593,7 @@
           <p:cNvPr id="26" name="Picture 25">
             <a:extLst>
               <a:ext uri="{FF2B5EF4-FFF2-40B4-BE49-F238E27FC236}">
-                <a16:creationId xmlns="" xmlns:a16="http://schemas.microsoft.com/office/drawing/2014/main" id="{247CFF3C-C4FA-493D-8505-DF469F4D36A4}"/>
+                <a16:creationId xmlns:a16="http://schemas.microsoft.com/office/drawing/2014/main" id="{247CFF3C-C4FA-493D-8505-DF469F4D36A4}"/>
               </a:ext>
             </a:extLst>
           </p:cNvPr>
@@ -3629,7 +3629,7 @@
           <p:cNvPr id="42" name="Picture 41">
             <a:extLst>
               <a:ext uri="{FF2B5EF4-FFF2-40B4-BE49-F238E27FC236}">
-                <a16:creationId xmlns="" xmlns:a16="http://schemas.microsoft.com/office/drawing/2014/main" id="{320846EB-6FC8-4F9D-97D0-A1A8E9CEE0DE}"/>
+                <a16:creationId xmlns:a16="http://schemas.microsoft.com/office/drawing/2014/main" id="{320846EB-6FC8-4F9D-97D0-A1A8E9CEE0DE}"/>
               </a:ext>
             </a:extLst>
           </p:cNvPr>
@@ -3665,7 +3665,7 @@
           <p:cNvPr id="2" name="Date Placeholder 1">
             <a:extLst>
               <a:ext uri="{FF2B5EF4-FFF2-40B4-BE49-F238E27FC236}">
-                <a16:creationId xmlns="" xmlns:a16="http://schemas.microsoft.com/office/drawing/2014/main" id="{839983C1-41F3-4B45-9E6B-F2615F743C0A}"/>
+                <a16:creationId xmlns:a16="http://schemas.microsoft.com/office/drawing/2014/main" id="{839983C1-41F3-4B45-9E6B-F2615F743C0A}"/>
               </a:ext>
             </a:extLst>
           </p:cNvPr>
@@ -3690,7 +3690,7 @@
           <p:cNvPr id="6" name="Footer Placeholder 5">
             <a:extLst>
               <a:ext uri="{FF2B5EF4-FFF2-40B4-BE49-F238E27FC236}">
-                <a16:creationId xmlns="" xmlns:a16="http://schemas.microsoft.com/office/drawing/2014/main" id="{A32622C9-3C7D-445D-83B2-28583716E287}"/>
+                <a16:creationId xmlns:a16="http://schemas.microsoft.com/office/drawing/2014/main" id="{A32622C9-3C7D-445D-83B2-28583716E287}"/>
               </a:ext>
             </a:extLst>
           </p:cNvPr>
@@ -3715,7 +3715,7 @@
           <p:cNvPr id="7" name="Slide Number Placeholder 6">
             <a:extLst>
               <a:ext uri="{FF2B5EF4-FFF2-40B4-BE49-F238E27FC236}">
-                <a16:creationId xmlns="" xmlns:a16="http://schemas.microsoft.com/office/drawing/2014/main" id="{2404DAB2-278F-4812-9F5E-FB63D8068383}"/>
+                <a16:creationId xmlns:a16="http://schemas.microsoft.com/office/drawing/2014/main" id="{2404DAB2-278F-4812-9F5E-FB63D8068383}"/>
               </a:ext>
             </a:extLst>
           </p:cNvPr>
@@ -3745,7 +3745,7 @@
           <p:cNvPr id="18" name="Picture 17">
             <a:extLst>
               <a:ext uri="{FF2B5EF4-FFF2-40B4-BE49-F238E27FC236}">
-                <a16:creationId xmlns="" xmlns:a16="http://schemas.microsoft.com/office/drawing/2014/main" id="{A0675455-B7FA-4569-A5FD-A3B0F20B2A26}"/>
+                <a16:creationId xmlns:a16="http://schemas.microsoft.com/office/drawing/2014/main" id="{A0675455-B7FA-4569-A5FD-A3B0F20B2A26}"/>
               </a:ext>
             </a:extLst>
           </p:cNvPr>
@@ -3781,7 +3781,7 @@
           <p:cNvPr id="20" name="Picture 19">
             <a:extLst>
               <a:ext uri="{FF2B5EF4-FFF2-40B4-BE49-F238E27FC236}">
-                <a16:creationId xmlns="" xmlns:a16="http://schemas.microsoft.com/office/drawing/2014/main" id="{827D15FD-4C66-4B85-98E6-7826AA8F61C6}"/>
+                <a16:creationId xmlns:a16="http://schemas.microsoft.com/office/drawing/2014/main" id="{827D15FD-4C66-4B85-98E6-7826AA8F61C6}"/>
               </a:ext>
             </a:extLst>
           </p:cNvPr>
@@ -3817,7 +3817,7 @@
           <p:cNvPr id="21" name="Picture 20">
             <a:extLst>
               <a:ext uri="{FF2B5EF4-FFF2-40B4-BE49-F238E27FC236}">
-                <a16:creationId xmlns="" xmlns:a16="http://schemas.microsoft.com/office/drawing/2014/main" id="{EA755AAE-BA08-481C-9224-0061170EE4B8}"/>
+                <a16:creationId xmlns:a16="http://schemas.microsoft.com/office/drawing/2014/main" id="{EA755AAE-BA08-481C-9224-0061170EE4B8}"/>
               </a:ext>
             </a:extLst>
           </p:cNvPr>
@@ -3853,7 +3853,7 @@
           <p:cNvPr id="22" name="Picture 21">
             <a:extLst>
               <a:ext uri="{FF2B5EF4-FFF2-40B4-BE49-F238E27FC236}">
-                <a16:creationId xmlns="" xmlns:a16="http://schemas.microsoft.com/office/drawing/2014/main" id="{0A83D66F-855B-463B-920B-BF239B01A206}"/>
+                <a16:creationId xmlns:a16="http://schemas.microsoft.com/office/drawing/2014/main" id="{0A83D66F-855B-463B-920B-BF239B01A206}"/>
               </a:ext>
             </a:extLst>
           </p:cNvPr>
@@ -3889,7 +3889,7 @@
           <p:cNvPr id="23" name="Picture 22">
             <a:extLst>
               <a:ext uri="{FF2B5EF4-FFF2-40B4-BE49-F238E27FC236}">
-                <a16:creationId xmlns="" xmlns:a16="http://schemas.microsoft.com/office/drawing/2014/main" id="{6643F71A-2013-433A-8322-FBAAED3162D8}"/>
+                <a16:creationId xmlns:a16="http://schemas.microsoft.com/office/drawing/2014/main" id="{6643F71A-2013-433A-8322-FBAAED3162D8}"/>
               </a:ext>
             </a:extLst>
           </p:cNvPr>
@@ -3925,7 +3925,7 @@
           <p:cNvPr id="24" name="Picture 23">
             <a:extLst>
               <a:ext uri="{FF2B5EF4-FFF2-40B4-BE49-F238E27FC236}">
-                <a16:creationId xmlns="" xmlns:a16="http://schemas.microsoft.com/office/drawing/2014/main" id="{B0812936-74B6-4265-8C08-AEDC8C798702}"/>
+                <a16:creationId xmlns:a16="http://schemas.microsoft.com/office/drawing/2014/main" id="{B0812936-74B6-4265-8C08-AEDC8C798702}"/>
               </a:ext>
             </a:extLst>
           </p:cNvPr>
@@ -3961,7 +3961,7 @@
           <p:cNvPr id="25" name="Picture 24">
             <a:extLst>
               <a:ext uri="{FF2B5EF4-FFF2-40B4-BE49-F238E27FC236}">
-                <a16:creationId xmlns="" xmlns:a16="http://schemas.microsoft.com/office/drawing/2014/main" id="{C74C190C-5856-41B9-8819-AE8DE0E10980}"/>
+                <a16:creationId xmlns:a16="http://schemas.microsoft.com/office/drawing/2014/main" id="{C74C190C-5856-41B9-8819-AE8DE0E10980}"/>
               </a:ext>
             </a:extLst>
           </p:cNvPr>
@@ -3997,7 +3997,7 @@
           <p:cNvPr id="27" name="Straight Connector 26">
             <a:extLst>
               <a:ext uri="{FF2B5EF4-FFF2-40B4-BE49-F238E27FC236}">
-                <a16:creationId xmlns="" xmlns:a16="http://schemas.microsoft.com/office/drawing/2014/main" id="{5F62FB7C-BD6E-4383-98C1-2CF30F34CAFD}"/>
+                <a16:creationId xmlns:a16="http://schemas.microsoft.com/office/drawing/2014/main" id="{5F62FB7C-BD6E-4383-98C1-2CF30F34CAFD}"/>
               </a:ext>
             </a:extLst>
           </p:cNvPr>
@@ -4036,7 +4036,7 @@
           <p:cNvPr id="28" name="Straight Connector 27">
             <a:extLst>
               <a:ext uri="{FF2B5EF4-FFF2-40B4-BE49-F238E27FC236}">
-                <a16:creationId xmlns="" xmlns:a16="http://schemas.microsoft.com/office/drawing/2014/main" id="{D4E5982E-3110-47E1-A5BB-91B7BECC3093}"/>
+                <a16:creationId xmlns:a16="http://schemas.microsoft.com/office/drawing/2014/main" id="{D4E5982E-3110-47E1-A5BB-91B7BECC3093}"/>
               </a:ext>
             </a:extLst>
           </p:cNvPr>
@@ -4073,7 +4073,7 @@
           <p:cNvPr id="29" name="Straight Connector 28">
             <a:extLst>
               <a:ext uri="{FF2B5EF4-FFF2-40B4-BE49-F238E27FC236}">
-                <a16:creationId xmlns="" xmlns:a16="http://schemas.microsoft.com/office/drawing/2014/main" id="{72BFE2F3-0845-4E5B-9375-E9D4027DD675}"/>
+                <a16:creationId xmlns:a16="http://schemas.microsoft.com/office/drawing/2014/main" id="{72BFE2F3-0845-4E5B-9375-E9D4027DD675}"/>
               </a:ext>
             </a:extLst>
           </p:cNvPr>
@@ -4110,7 +4110,7 @@
           <p:cNvPr id="30" name="Straight Connector 29">
             <a:extLst>
               <a:ext uri="{FF2B5EF4-FFF2-40B4-BE49-F238E27FC236}">
-                <a16:creationId xmlns="" xmlns:a16="http://schemas.microsoft.com/office/drawing/2014/main" id="{93DDBF37-0764-47AA-94E3-9A44F3ED8FB5}"/>
+                <a16:creationId xmlns:a16="http://schemas.microsoft.com/office/drawing/2014/main" id="{93DDBF37-0764-47AA-94E3-9A44F3ED8FB5}"/>
               </a:ext>
             </a:extLst>
           </p:cNvPr>
@@ -4147,7 +4147,7 @@
           <p:cNvPr id="31" name="Straight Connector 30">
             <a:extLst>
               <a:ext uri="{FF2B5EF4-FFF2-40B4-BE49-F238E27FC236}">
-                <a16:creationId xmlns="" xmlns:a16="http://schemas.microsoft.com/office/drawing/2014/main" id="{299ABE09-E33C-46B7-A80D-7BF4A6956211}"/>
+                <a16:creationId xmlns:a16="http://schemas.microsoft.com/office/drawing/2014/main" id="{299ABE09-E33C-46B7-A80D-7BF4A6956211}"/>
               </a:ext>
             </a:extLst>
           </p:cNvPr>
@@ -4184,7 +4184,7 @@
           <p:cNvPr id="32" name="Straight Connector 31">
             <a:extLst>
               <a:ext uri="{FF2B5EF4-FFF2-40B4-BE49-F238E27FC236}">
-                <a16:creationId xmlns="" xmlns:a16="http://schemas.microsoft.com/office/drawing/2014/main" id="{6E91D320-3732-40B8-864D-142D0A277ED1}"/>
+                <a16:creationId xmlns:a16="http://schemas.microsoft.com/office/drawing/2014/main" id="{6E91D320-3732-40B8-864D-142D0A277ED1}"/>
               </a:ext>
             </a:extLst>
           </p:cNvPr>
@@ -4223,7 +4223,7 @@
           <p:cNvPr id="33" name="Straight Connector 32">
             <a:extLst>
               <a:ext uri="{FF2B5EF4-FFF2-40B4-BE49-F238E27FC236}">
-                <a16:creationId xmlns="" xmlns:a16="http://schemas.microsoft.com/office/drawing/2014/main" id="{5C63D1E8-4A92-4691-8A24-A2FC7E8008E5}"/>
+                <a16:creationId xmlns:a16="http://schemas.microsoft.com/office/drawing/2014/main" id="{5C63D1E8-4A92-4691-8A24-A2FC7E8008E5}"/>
               </a:ext>
             </a:extLst>
           </p:cNvPr>
@@ -4262,7 +4262,7 @@
           <p:cNvPr id="34" name="Straight Connector 33">
             <a:extLst>
               <a:ext uri="{FF2B5EF4-FFF2-40B4-BE49-F238E27FC236}">
-                <a16:creationId xmlns="" xmlns:a16="http://schemas.microsoft.com/office/drawing/2014/main" id="{C84A0FE1-723D-4682-8682-77BAD950EE15}"/>
+                <a16:creationId xmlns:a16="http://schemas.microsoft.com/office/drawing/2014/main" id="{C84A0FE1-723D-4682-8682-77BAD950EE15}"/>
               </a:ext>
             </a:extLst>
           </p:cNvPr>
@@ -4299,7 +4299,7 @@
           <p:cNvPr id="35" name="Rectangle 34">
             <a:extLst>
               <a:ext uri="{FF2B5EF4-FFF2-40B4-BE49-F238E27FC236}">
-                <a16:creationId xmlns="" xmlns:a16="http://schemas.microsoft.com/office/drawing/2014/main" id="{550A59F9-9A9D-4956-95B4-F78CC0DB1D59}"/>
+                <a16:creationId xmlns:a16="http://schemas.microsoft.com/office/drawing/2014/main" id="{550A59F9-9A9D-4956-95B4-F78CC0DB1D59}"/>
               </a:ext>
             </a:extLst>
           </p:cNvPr>
@@ -4380,7 +4380,7 @@
           <p:cNvPr id="37" name="Picture 36">
             <a:extLst>
               <a:ext uri="{FF2B5EF4-FFF2-40B4-BE49-F238E27FC236}">
-                <a16:creationId xmlns="" xmlns:a16="http://schemas.microsoft.com/office/drawing/2014/main" id="{8AF69835-F228-45D6-B39E-583EEBF1FE2D}"/>
+                <a16:creationId xmlns:a16="http://schemas.microsoft.com/office/drawing/2014/main" id="{8AF69835-F228-45D6-B39E-583EEBF1FE2D}"/>
               </a:ext>
             </a:extLst>
           </p:cNvPr>
@@ -4416,7 +4416,7 @@
           <p:cNvPr id="38" name="Picture 37">
             <a:extLst>
               <a:ext uri="{FF2B5EF4-FFF2-40B4-BE49-F238E27FC236}">
-                <a16:creationId xmlns="" xmlns:a16="http://schemas.microsoft.com/office/drawing/2014/main" id="{0577C4C0-8539-4520-A497-BBFB45821D24}"/>
+                <a16:creationId xmlns:a16="http://schemas.microsoft.com/office/drawing/2014/main" id="{0577C4C0-8539-4520-A497-BBFB45821D24}"/>
               </a:ext>
             </a:extLst>
           </p:cNvPr>
@@ -4452,7 +4452,7 @@
           <p:cNvPr id="39" name="Picture 38">
             <a:extLst>
               <a:ext uri="{FF2B5EF4-FFF2-40B4-BE49-F238E27FC236}">
-                <a16:creationId xmlns="" xmlns:a16="http://schemas.microsoft.com/office/drawing/2014/main" id="{16073A22-1B90-4D35-943B-5D9816FEB8FE}"/>
+                <a16:creationId xmlns:a16="http://schemas.microsoft.com/office/drawing/2014/main" id="{16073A22-1B90-4D35-943B-5D9816FEB8FE}"/>
               </a:ext>
             </a:extLst>
           </p:cNvPr>
@@ -4488,7 +4488,7 @@
           <p:cNvPr id="40" name="Picture 39">
             <a:extLst>
               <a:ext uri="{FF2B5EF4-FFF2-40B4-BE49-F238E27FC236}">
-                <a16:creationId xmlns="" xmlns:a16="http://schemas.microsoft.com/office/drawing/2014/main" id="{F7C8CFEA-27DA-4058-A611-3AE53851908C}"/>
+                <a16:creationId xmlns:a16="http://schemas.microsoft.com/office/drawing/2014/main" id="{F7C8CFEA-27DA-4058-A611-3AE53851908C}"/>
               </a:ext>
             </a:extLst>
           </p:cNvPr>
@@ -4524,7 +4524,7 @@
           <p:cNvPr id="41" name="Picture 40">
             <a:extLst>
               <a:ext uri="{FF2B5EF4-FFF2-40B4-BE49-F238E27FC236}">
-                <a16:creationId xmlns="" xmlns:a16="http://schemas.microsoft.com/office/drawing/2014/main" id="{CE9346DD-5152-48D0-8B06-7F8CE9803DAB}"/>
+                <a16:creationId xmlns:a16="http://schemas.microsoft.com/office/drawing/2014/main" id="{CE9346DD-5152-48D0-8B06-7F8CE9803DAB}"/>
               </a:ext>
             </a:extLst>
           </p:cNvPr>
@@ -4560,7 +4560,7 @@
           <p:cNvPr id="43" name="Picture 42">
             <a:extLst>
               <a:ext uri="{FF2B5EF4-FFF2-40B4-BE49-F238E27FC236}">
-                <a16:creationId xmlns="" xmlns:a16="http://schemas.microsoft.com/office/drawing/2014/main" id="{F6B4B602-D2C7-47C8-9470-2C5795ED8C22}"/>
+                <a16:creationId xmlns:a16="http://schemas.microsoft.com/office/drawing/2014/main" id="{F6B4B602-D2C7-47C8-9470-2C5795ED8C22}"/>
               </a:ext>
             </a:extLst>
           </p:cNvPr>
@@ -4596,7 +4596,7 @@
           <p:cNvPr id="44" name="Picture 43">
             <a:extLst>
               <a:ext uri="{FF2B5EF4-FFF2-40B4-BE49-F238E27FC236}">
-                <a16:creationId xmlns="" xmlns:a16="http://schemas.microsoft.com/office/drawing/2014/main" id="{103B7E6D-AFDD-45E1-8121-F42E465AB0E8}"/>
+                <a16:creationId xmlns:a16="http://schemas.microsoft.com/office/drawing/2014/main" id="{103B7E6D-AFDD-45E1-8121-F42E465AB0E8}"/>
               </a:ext>
             </a:extLst>
           </p:cNvPr>
@@ -4632,7 +4632,7 @@
           <p:cNvPr id="45" name="Straight Connector 44">
             <a:extLst>
               <a:ext uri="{FF2B5EF4-FFF2-40B4-BE49-F238E27FC236}">
-                <a16:creationId xmlns="" xmlns:a16="http://schemas.microsoft.com/office/drawing/2014/main" id="{5FA3191E-14EF-4DC3-AD93-CA289B12B4C9}"/>
+                <a16:creationId xmlns:a16="http://schemas.microsoft.com/office/drawing/2014/main" id="{5FA3191E-14EF-4DC3-AD93-CA289B12B4C9}"/>
               </a:ext>
             </a:extLst>
           </p:cNvPr>
@@ -4671,7 +4671,7 @@
           <p:cNvPr id="46" name="Straight Connector 45">
             <a:extLst>
               <a:ext uri="{FF2B5EF4-FFF2-40B4-BE49-F238E27FC236}">
-                <a16:creationId xmlns="" xmlns:a16="http://schemas.microsoft.com/office/drawing/2014/main" id="{AB530A8A-ABDE-4B7F-B28B-A9B499B32225}"/>
+                <a16:creationId xmlns:a16="http://schemas.microsoft.com/office/drawing/2014/main" id="{AB530A8A-ABDE-4B7F-B28B-A9B499B32225}"/>
               </a:ext>
             </a:extLst>
           </p:cNvPr>
@@ -4708,7 +4708,7 @@
           <p:cNvPr id="47" name="Straight Connector 46">
             <a:extLst>
               <a:ext uri="{FF2B5EF4-FFF2-40B4-BE49-F238E27FC236}">
-                <a16:creationId xmlns="" xmlns:a16="http://schemas.microsoft.com/office/drawing/2014/main" id="{E5ADF575-91AD-4F69-BA66-356B62AEB683}"/>
+                <a16:creationId xmlns:a16="http://schemas.microsoft.com/office/drawing/2014/main" id="{E5ADF575-91AD-4F69-BA66-356B62AEB683}"/>
               </a:ext>
             </a:extLst>
           </p:cNvPr>
@@ -4745,7 +4745,7 @@
           <p:cNvPr id="48" name="Straight Connector 47">
             <a:extLst>
               <a:ext uri="{FF2B5EF4-FFF2-40B4-BE49-F238E27FC236}">
-                <a16:creationId xmlns="" xmlns:a16="http://schemas.microsoft.com/office/drawing/2014/main" id="{D60C0104-2410-4352-A800-FD0292CC11A7}"/>
+                <a16:creationId xmlns:a16="http://schemas.microsoft.com/office/drawing/2014/main" id="{D60C0104-2410-4352-A800-FD0292CC11A7}"/>
               </a:ext>
             </a:extLst>
           </p:cNvPr>
@@ -4782,7 +4782,7 @@
           <p:cNvPr id="49" name="Straight Connector 48">
             <a:extLst>
               <a:ext uri="{FF2B5EF4-FFF2-40B4-BE49-F238E27FC236}">
-                <a16:creationId xmlns="" xmlns:a16="http://schemas.microsoft.com/office/drawing/2014/main" id="{10FB7F08-6662-4D0C-AFAB-CFFDE9B1CA0A}"/>
+                <a16:creationId xmlns:a16="http://schemas.microsoft.com/office/drawing/2014/main" id="{10FB7F08-6662-4D0C-AFAB-CFFDE9B1CA0A}"/>
               </a:ext>
             </a:extLst>
           </p:cNvPr>
@@ -4819,7 +4819,7 @@
           <p:cNvPr id="50" name="Straight Connector 49">
             <a:extLst>
               <a:ext uri="{FF2B5EF4-FFF2-40B4-BE49-F238E27FC236}">
-                <a16:creationId xmlns="" xmlns:a16="http://schemas.microsoft.com/office/drawing/2014/main" id="{379635D4-E3FF-4174-A648-032E9615851B}"/>
+                <a16:creationId xmlns:a16="http://schemas.microsoft.com/office/drawing/2014/main" id="{379635D4-E3FF-4174-A648-032E9615851B}"/>
               </a:ext>
             </a:extLst>
           </p:cNvPr>
@@ -4858,7 +4858,7 @@
           <p:cNvPr id="51" name="Straight Connector 50">
             <a:extLst>
               <a:ext uri="{FF2B5EF4-FFF2-40B4-BE49-F238E27FC236}">
-                <a16:creationId xmlns="" xmlns:a16="http://schemas.microsoft.com/office/drawing/2014/main" id="{0601A2EF-9181-444B-8898-83A36D09B869}"/>
+                <a16:creationId xmlns:a16="http://schemas.microsoft.com/office/drawing/2014/main" id="{0601A2EF-9181-444B-8898-83A36D09B869}"/>
               </a:ext>
             </a:extLst>
           </p:cNvPr>
@@ -4897,7 +4897,7 @@
           <p:cNvPr id="52" name="Straight Connector 51">
             <a:extLst>
               <a:ext uri="{FF2B5EF4-FFF2-40B4-BE49-F238E27FC236}">
-                <a16:creationId xmlns="" xmlns:a16="http://schemas.microsoft.com/office/drawing/2014/main" id="{307F38C1-A87B-4D59-BE69-6A23413F5870}"/>
+                <a16:creationId xmlns:a16="http://schemas.microsoft.com/office/drawing/2014/main" id="{307F38C1-A87B-4D59-BE69-6A23413F5870}"/>
               </a:ext>
             </a:extLst>
           </p:cNvPr>
@@ -4949,7 +4949,7 @@
   </mc:AlternateContent>
   <p:extLst mod="1">
     <p:ext uri="{DCECCB84-F9BA-43D5-87BE-67443E8EF086}">
-      <p15:sldGuideLst xmlns:p15="http://schemas.microsoft.com/office/powerpoint/2012/main" xmlns="">
+      <p15:sldGuideLst xmlns:p15="http://schemas.microsoft.com/office/powerpoint/2012/main">
         <p15:guide id="1" orient="horz" pos="2160">
           <p15:clr>
             <a:srgbClr val="FBAE40"/>
@@ -4988,7 +4988,7 @@
           <p:cNvPr id="13" name="Picture 12">
             <a:extLst>
               <a:ext uri="{FF2B5EF4-FFF2-40B4-BE49-F238E27FC236}">
-                <a16:creationId xmlns="" xmlns:a16="http://schemas.microsoft.com/office/drawing/2014/main" id="{C00C2D88-4D3E-4C4B-AFD7-B7EA2768B8F5}"/>
+                <a16:creationId xmlns:a16="http://schemas.microsoft.com/office/drawing/2014/main" id="{C00C2D88-4D3E-4C4B-AFD7-B7EA2768B8F5}"/>
               </a:ext>
             </a:extLst>
           </p:cNvPr>
@@ -5017,7 +5017,7 @@
           <p:cNvPr id="3" name="Date Placeholder 2">
             <a:extLst>
               <a:ext uri="{FF2B5EF4-FFF2-40B4-BE49-F238E27FC236}">
-                <a16:creationId xmlns="" xmlns:a16="http://schemas.microsoft.com/office/drawing/2014/main" id="{FAA51FC5-6AB6-4A04-9304-C6C88E9B29FA}"/>
+                <a16:creationId xmlns:a16="http://schemas.microsoft.com/office/drawing/2014/main" id="{FAA51FC5-6AB6-4A04-9304-C6C88E9B29FA}"/>
               </a:ext>
             </a:extLst>
           </p:cNvPr>
@@ -5042,7 +5042,7 @@
           <p:cNvPr id="4" name="Footer Placeholder 3">
             <a:extLst>
               <a:ext uri="{FF2B5EF4-FFF2-40B4-BE49-F238E27FC236}">
-                <a16:creationId xmlns="" xmlns:a16="http://schemas.microsoft.com/office/drawing/2014/main" id="{75D83D18-FDC7-4C48-A949-71D2969C594A}"/>
+                <a16:creationId xmlns:a16="http://schemas.microsoft.com/office/drawing/2014/main" id="{75D83D18-FDC7-4C48-A949-71D2969C594A}"/>
               </a:ext>
             </a:extLst>
           </p:cNvPr>
@@ -5067,7 +5067,7 @@
           <p:cNvPr id="5" name="Slide Number Placeholder 4">
             <a:extLst>
               <a:ext uri="{FF2B5EF4-FFF2-40B4-BE49-F238E27FC236}">
-                <a16:creationId xmlns="" xmlns:a16="http://schemas.microsoft.com/office/drawing/2014/main" id="{6AFAD92E-A653-4789-B55D-8A2181002B59}"/>
+                <a16:creationId xmlns:a16="http://schemas.microsoft.com/office/drawing/2014/main" id="{6AFAD92E-A653-4789-B55D-8A2181002B59}"/>
               </a:ext>
             </a:extLst>
           </p:cNvPr>
@@ -5098,7 +5098,7 @@
             <a:hlinkClick r:id="rId3"/>
             <a:extLst>
               <a:ext uri="{FF2B5EF4-FFF2-40B4-BE49-F238E27FC236}">
-                <a16:creationId xmlns="" xmlns:a16="http://schemas.microsoft.com/office/drawing/2014/main" id="{7C54483B-C622-499B-BAE8-467BFD3E1080}"/>
+                <a16:creationId xmlns:a16="http://schemas.microsoft.com/office/drawing/2014/main" id="{7C54483B-C622-499B-BAE8-467BFD3E1080}"/>
               </a:ext>
             </a:extLst>
           </p:cNvPr>
@@ -5137,7 +5137,7 @@
             <a:hlinkClick r:id="rId5"/>
             <a:extLst>
               <a:ext uri="{FF2B5EF4-FFF2-40B4-BE49-F238E27FC236}">
-                <a16:creationId xmlns="" xmlns:a16="http://schemas.microsoft.com/office/drawing/2014/main" id="{7AF9BEA8-CB87-4D39-873A-4E7E04D46685}"/>
+                <a16:creationId xmlns:a16="http://schemas.microsoft.com/office/drawing/2014/main" id="{7AF9BEA8-CB87-4D39-873A-4E7E04D46685}"/>
               </a:ext>
             </a:extLst>
           </p:cNvPr>
@@ -5176,7 +5176,7 @@
             <a:hlinkClick r:id="rId7"/>
             <a:extLst>
               <a:ext uri="{FF2B5EF4-FFF2-40B4-BE49-F238E27FC236}">
-                <a16:creationId xmlns="" xmlns:a16="http://schemas.microsoft.com/office/drawing/2014/main" id="{7DFD3364-5D9B-4B91-B09C-8540E820560A}"/>
+                <a16:creationId xmlns:a16="http://schemas.microsoft.com/office/drawing/2014/main" id="{7DFD3364-5D9B-4B91-B09C-8540E820560A}"/>
               </a:ext>
             </a:extLst>
           </p:cNvPr>
@@ -5215,7 +5215,7 @@
             <a:hlinkClick r:id="rId9"/>
             <a:extLst>
               <a:ext uri="{FF2B5EF4-FFF2-40B4-BE49-F238E27FC236}">
-                <a16:creationId xmlns="" xmlns:a16="http://schemas.microsoft.com/office/drawing/2014/main" id="{F0386401-29A7-4448-AB68-1289BA211F55}"/>
+                <a16:creationId xmlns:a16="http://schemas.microsoft.com/office/drawing/2014/main" id="{F0386401-29A7-4448-AB68-1289BA211F55}"/>
               </a:ext>
             </a:extLst>
           </p:cNvPr>
@@ -5253,7 +5253,7 @@
             <a:hlinkClick r:id="rId11"/>
             <a:extLst>
               <a:ext uri="{FF2B5EF4-FFF2-40B4-BE49-F238E27FC236}">
-                <a16:creationId xmlns="" xmlns:a16="http://schemas.microsoft.com/office/drawing/2014/main" id="{CDC9F208-E4B0-4626-BBAD-F54DFF0CF9B5}"/>
+                <a16:creationId xmlns:a16="http://schemas.microsoft.com/office/drawing/2014/main" id="{CDC9F208-E4B0-4626-BBAD-F54DFF0CF9B5}"/>
               </a:ext>
             </a:extLst>
           </p:cNvPr>
@@ -5292,7 +5292,7 @@
             <a:hlinkClick r:id="rId13"/>
             <a:extLst>
               <a:ext uri="{FF2B5EF4-FFF2-40B4-BE49-F238E27FC236}">
-                <a16:creationId xmlns="" xmlns:a16="http://schemas.microsoft.com/office/drawing/2014/main" id="{1DE8CA65-1470-4A40-9B49-AFF7E19C21A0}"/>
+                <a16:creationId xmlns:a16="http://schemas.microsoft.com/office/drawing/2014/main" id="{1DE8CA65-1470-4A40-9B49-AFF7E19C21A0}"/>
               </a:ext>
             </a:extLst>
           </p:cNvPr>
@@ -5330,7 +5330,7 @@
           <p:cNvPr id="14" name="Rectangle 13">
             <a:extLst>
               <a:ext uri="{FF2B5EF4-FFF2-40B4-BE49-F238E27FC236}">
-                <a16:creationId xmlns="" xmlns:a16="http://schemas.microsoft.com/office/drawing/2014/main" id="{26991FD8-5C91-4C3D-9F00-7203C811B463}"/>
+                <a16:creationId xmlns:a16="http://schemas.microsoft.com/office/drawing/2014/main" id="{26991FD8-5C91-4C3D-9F00-7203C811B463}"/>
               </a:ext>
             </a:extLst>
           </p:cNvPr>
@@ -5411,7 +5411,7 @@
           <p:cNvPr id="2" name="Title 1">
             <a:extLst>
               <a:ext uri="{FF2B5EF4-FFF2-40B4-BE49-F238E27FC236}">
-                <a16:creationId xmlns="" xmlns:a16="http://schemas.microsoft.com/office/drawing/2014/main" id="{239E3AAC-161E-41EF-A701-E46A497FCC37}"/>
+                <a16:creationId xmlns:a16="http://schemas.microsoft.com/office/drawing/2014/main" id="{239E3AAC-161E-41EF-A701-E46A497FCC37}"/>
               </a:ext>
             </a:extLst>
           </p:cNvPr>
@@ -5457,7 +5457,7 @@
           <p:cNvPr id="15" name="Picture 14">
             <a:extLst>
               <a:ext uri="{FF2B5EF4-FFF2-40B4-BE49-F238E27FC236}">
-                <a16:creationId xmlns="" xmlns:a16="http://schemas.microsoft.com/office/drawing/2014/main" id="{3F691F48-DCAC-4489-AA09-7346B7E67855}"/>
+                <a16:creationId xmlns:a16="http://schemas.microsoft.com/office/drawing/2014/main" id="{3F691F48-DCAC-4489-AA09-7346B7E67855}"/>
               </a:ext>
             </a:extLst>
           </p:cNvPr>
@@ -5531,7 +5531,7 @@
           <p:cNvPr id="13" name="Picture 12">
             <a:extLst>
               <a:ext uri="{FF2B5EF4-FFF2-40B4-BE49-F238E27FC236}">
-                <a16:creationId xmlns="" xmlns:a16="http://schemas.microsoft.com/office/drawing/2014/main" id="{C00C2D88-4D3E-4C4B-AFD7-B7EA2768B8F5}"/>
+                <a16:creationId xmlns:a16="http://schemas.microsoft.com/office/drawing/2014/main" id="{C00C2D88-4D3E-4C4B-AFD7-B7EA2768B8F5}"/>
               </a:ext>
             </a:extLst>
           </p:cNvPr>
@@ -5560,7 +5560,7 @@
           <p:cNvPr id="14" name="Rectangle 13">
             <a:extLst>
               <a:ext uri="{FF2B5EF4-FFF2-40B4-BE49-F238E27FC236}">
-                <a16:creationId xmlns="" xmlns:a16="http://schemas.microsoft.com/office/drawing/2014/main" id="{26991FD8-5C91-4C3D-9F00-7203C811B463}"/>
+                <a16:creationId xmlns:a16="http://schemas.microsoft.com/office/drawing/2014/main" id="{26991FD8-5C91-4C3D-9F00-7203C811B463}"/>
               </a:ext>
             </a:extLst>
           </p:cNvPr>
@@ -5641,7 +5641,7 @@
           <p:cNvPr id="2" name="Title 1">
             <a:extLst>
               <a:ext uri="{FF2B5EF4-FFF2-40B4-BE49-F238E27FC236}">
-                <a16:creationId xmlns="" xmlns:a16="http://schemas.microsoft.com/office/drawing/2014/main" id="{239E3AAC-161E-41EF-A701-E46A497FCC37}"/>
+                <a16:creationId xmlns:a16="http://schemas.microsoft.com/office/drawing/2014/main" id="{239E3AAC-161E-41EF-A701-E46A497FCC37}"/>
               </a:ext>
             </a:extLst>
           </p:cNvPr>
@@ -5688,7 +5688,7 @@
             <a:hlinkClick r:id="rId3"/>
             <a:extLst>
               <a:ext uri="{FF2B5EF4-FFF2-40B4-BE49-F238E27FC236}">
-                <a16:creationId xmlns="" xmlns:a16="http://schemas.microsoft.com/office/drawing/2014/main" id="{61839306-7842-46B9-A463-C24420A37C0A}"/>
+                <a16:creationId xmlns:a16="http://schemas.microsoft.com/office/drawing/2014/main" id="{61839306-7842-46B9-A463-C24420A37C0A}"/>
               </a:ext>
             </a:extLst>
           </p:cNvPr>
@@ -5732,7 +5732,7 @@
             <a:hlinkClick r:id="rId5"/>
             <a:extLst>
               <a:ext uri="{FF2B5EF4-FFF2-40B4-BE49-F238E27FC236}">
-                <a16:creationId xmlns="" xmlns:a16="http://schemas.microsoft.com/office/drawing/2014/main" id="{F5EB795D-0B62-4CCB-983D-13BD9B3CD0A5}"/>
+                <a16:creationId xmlns:a16="http://schemas.microsoft.com/office/drawing/2014/main" id="{F5EB795D-0B62-4CCB-983D-13BD9B3CD0A5}"/>
               </a:ext>
             </a:extLst>
           </p:cNvPr>
@@ -5780,7 +5780,7 @@
             <a:hlinkClick r:id="rId7"/>
             <a:extLst>
               <a:ext uri="{FF2B5EF4-FFF2-40B4-BE49-F238E27FC236}">
-                <a16:creationId xmlns="" xmlns:a16="http://schemas.microsoft.com/office/drawing/2014/main" id="{91C19F79-E05B-4929-A929-287F44EB3C94}"/>
+                <a16:creationId xmlns:a16="http://schemas.microsoft.com/office/drawing/2014/main" id="{91C19F79-E05B-4929-A929-287F44EB3C94}"/>
               </a:ext>
             </a:extLst>
           </p:cNvPr>
@@ -5828,7 +5828,7 @@
             <a:hlinkClick r:id="rId9"/>
             <a:extLst>
               <a:ext uri="{FF2B5EF4-FFF2-40B4-BE49-F238E27FC236}">
-                <a16:creationId xmlns="" xmlns:a16="http://schemas.microsoft.com/office/drawing/2014/main" id="{B38FBC35-D604-40D3-8560-90C506EBA728}"/>
+                <a16:creationId xmlns:a16="http://schemas.microsoft.com/office/drawing/2014/main" id="{B38FBC35-D604-40D3-8560-90C506EBA728}"/>
               </a:ext>
             </a:extLst>
           </p:cNvPr>
@@ -5874,7 +5874,7 @@
             <a:hlinkClick r:id="rId11"/>
             <a:extLst>
               <a:ext uri="{FF2B5EF4-FFF2-40B4-BE49-F238E27FC236}">
-                <a16:creationId xmlns="" xmlns:a16="http://schemas.microsoft.com/office/drawing/2014/main" id="{71103A5B-EAFD-46BF-93EB-10FFF58B7532}"/>
+                <a16:creationId xmlns:a16="http://schemas.microsoft.com/office/drawing/2014/main" id="{71103A5B-EAFD-46BF-93EB-10FFF58B7532}"/>
               </a:ext>
             </a:extLst>
           </p:cNvPr>
@@ -5922,7 +5922,7 @@
             <a:hlinkClick r:id="rId13"/>
             <a:extLst>
               <a:ext uri="{FF2B5EF4-FFF2-40B4-BE49-F238E27FC236}">
-                <a16:creationId xmlns="" xmlns:a16="http://schemas.microsoft.com/office/drawing/2014/main" id="{EDA50EFF-7A2E-4BB9-A7A8-5BBF9EE3DB69}"/>
+                <a16:creationId xmlns:a16="http://schemas.microsoft.com/office/drawing/2014/main" id="{EDA50EFF-7A2E-4BB9-A7A8-5BBF9EE3DB69}"/>
               </a:ext>
             </a:extLst>
           </p:cNvPr>
@@ -5969,7 +5969,7 @@
           <p:cNvPr id="21" name="Picture 20">
             <a:extLst>
               <a:ext uri="{FF2B5EF4-FFF2-40B4-BE49-F238E27FC236}">
-                <a16:creationId xmlns="" xmlns:a16="http://schemas.microsoft.com/office/drawing/2014/main" id="{31C8BF23-28B4-4942-902F-58C0B92A760B}"/>
+                <a16:creationId xmlns:a16="http://schemas.microsoft.com/office/drawing/2014/main" id="{31C8BF23-28B4-4942-902F-58C0B92A760B}"/>
               </a:ext>
             </a:extLst>
           </p:cNvPr>
@@ -6043,7 +6043,7 @@
           <p:cNvPr id="8" name="Picture 7">
             <a:extLst>
               <a:ext uri="{FF2B5EF4-FFF2-40B4-BE49-F238E27FC236}">
-                <a16:creationId xmlns="" xmlns:a16="http://schemas.microsoft.com/office/drawing/2014/main" id="{21DA41A3-0295-46DF-A320-41070D15EA50}"/>
+                <a16:creationId xmlns:a16="http://schemas.microsoft.com/office/drawing/2014/main" id="{21DA41A3-0295-46DF-A320-41070D15EA50}"/>
               </a:ext>
             </a:extLst>
           </p:cNvPr>
@@ -6072,7 +6072,7 @@
           <p:cNvPr id="12" name="Content Placeholder 3">
             <a:extLst>
               <a:ext uri="{FF2B5EF4-FFF2-40B4-BE49-F238E27FC236}">
-                <a16:creationId xmlns="" xmlns:a16="http://schemas.microsoft.com/office/drawing/2014/main" id="{0C1F9416-8B6E-46DE-973C-777785E27A26}"/>
+                <a16:creationId xmlns:a16="http://schemas.microsoft.com/office/drawing/2014/main" id="{0C1F9416-8B6E-46DE-973C-777785E27A26}"/>
               </a:ext>
             </a:extLst>
           </p:cNvPr>
@@ -6298,7 +6298,7 @@
             <a:hlinkClick r:id="rId7" tooltip="Software University @ Facebook"/>
             <a:extLst>
               <a:ext uri="{FF2B5EF4-FFF2-40B4-BE49-F238E27FC236}">
-                <a16:creationId xmlns="" xmlns:a16="http://schemas.microsoft.com/office/drawing/2014/main" id="{0101C673-F197-4525-ADDC-FFD181E4E167}"/>
+                <a16:creationId xmlns:a16="http://schemas.microsoft.com/office/drawing/2014/main" id="{0101C673-F197-4525-ADDC-FFD181E4E167}"/>
               </a:ext>
             </a:extLst>
           </p:cNvPr>
@@ -6345,7 +6345,7 @@
             <a:hlinkClick r:id="rId6" tooltip="Software University Discussion Forum"/>
             <a:extLst>
               <a:ext uri="{FF2B5EF4-FFF2-40B4-BE49-F238E27FC236}">
-                <a16:creationId xmlns="" xmlns:a16="http://schemas.microsoft.com/office/drawing/2014/main" id="{A584039C-C3B0-4714-A6D0-181CA3D2DD26}"/>
+                <a16:creationId xmlns:a16="http://schemas.microsoft.com/office/drawing/2014/main" id="{A584039C-C3B0-4714-A6D0-181CA3D2DD26}"/>
               </a:ext>
             </a:extLst>
           </p:cNvPr>
@@ -6382,7 +6382,7 @@
             <a:hlinkClick r:id="rId3"/>
             <a:extLst>
               <a:ext uri="{FF2B5EF4-FFF2-40B4-BE49-F238E27FC236}">
-                <a16:creationId xmlns="" xmlns:a16="http://schemas.microsoft.com/office/drawing/2014/main" id="{07C965FA-A87E-4824-AFA8-C67AF548A76A}"/>
+                <a16:creationId xmlns:a16="http://schemas.microsoft.com/office/drawing/2014/main" id="{07C965FA-A87E-4824-AFA8-C67AF548A76A}"/>
               </a:ext>
             </a:extLst>
           </p:cNvPr>
@@ -6418,7 +6418,7 @@
           <p:cNvPr id="3" name="Picture 2">
             <a:extLst>
               <a:ext uri="{FF2B5EF4-FFF2-40B4-BE49-F238E27FC236}">
-                <a16:creationId xmlns="" xmlns:a16="http://schemas.microsoft.com/office/drawing/2014/main" id="{7DC5D9AB-27D1-4866-B85E-1728987FAEF5}"/>
+                <a16:creationId xmlns:a16="http://schemas.microsoft.com/office/drawing/2014/main" id="{7DC5D9AB-27D1-4866-B85E-1728987FAEF5}"/>
               </a:ext>
             </a:extLst>
           </p:cNvPr>
@@ -6454,7 +6454,7 @@
           <p:cNvPr id="10" name="Rectangle 9">
             <a:extLst>
               <a:ext uri="{FF2B5EF4-FFF2-40B4-BE49-F238E27FC236}">
-                <a16:creationId xmlns="" xmlns:a16="http://schemas.microsoft.com/office/drawing/2014/main" id="{86646B95-5E3B-4DE8-9118-031C2C296D8C}"/>
+                <a16:creationId xmlns:a16="http://schemas.microsoft.com/office/drawing/2014/main" id="{86646B95-5E3B-4DE8-9118-031C2C296D8C}"/>
               </a:ext>
             </a:extLst>
           </p:cNvPr>
@@ -6535,7 +6535,7 @@
           <p:cNvPr id="18" name="Title 17">
             <a:extLst>
               <a:ext uri="{FF2B5EF4-FFF2-40B4-BE49-F238E27FC236}">
-                <a16:creationId xmlns="" xmlns:a16="http://schemas.microsoft.com/office/drawing/2014/main" id="{AE87ED9C-76E1-4D85-9B06-3AF44AABB668}"/>
+                <a16:creationId xmlns:a16="http://schemas.microsoft.com/office/drawing/2014/main" id="{AE87ED9C-76E1-4D85-9B06-3AF44AABB668}"/>
               </a:ext>
             </a:extLst>
           </p:cNvPr>
@@ -6622,7 +6622,7 @@
           <p:cNvPr id="10" name="Picture 9">
             <a:extLst>
               <a:ext uri="{FF2B5EF4-FFF2-40B4-BE49-F238E27FC236}">
-                <a16:creationId xmlns="" xmlns:a16="http://schemas.microsoft.com/office/drawing/2014/main" id="{89AD94B5-9922-4E42-89CE-3C445EFB152E}"/>
+                <a16:creationId xmlns:a16="http://schemas.microsoft.com/office/drawing/2014/main" id="{89AD94B5-9922-4E42-89CE-3C445EFB152E}"/>
               </a:ext>
             </a:extLst>
           </p:cNvPr>
@@ -6651,7 +6651,7 @@
           <p:cNvPr id="13" name="Rectangle 12">
             <a:extLst>
               <a:ext uri="{FF2B5EF4-FFF2-40B4-BE49-F238E27FC236}">
-                <a16:creationId xmlns="" xmlns:a16="http://schemas.microsoft.com/office/drawing/2014/main" id="{391AFA4E-7870-4561-A1B8-AC956B0C8931}"/>
+                <a16:creationId xmlns:a16="http://schemas.microsoft.com/office/drawing/2014/main" id="{391AFA4E-7870-4561-A1B8-AC956B0C8931}"/>
               </a:ext>
             </a:extLst>
           </p:cNvPr>
@@ -6732,7 +6732,7 @@
           <p:cNvPr id="3" name="Text Placeholder 2">
             <a:extLst>
               <a:ext uri="{FF2B5EF4-FFF2-40B4-BE49-F238E27FC236}">
-                <a16:creationId xmlns="" xmlns:a16="http://schemas.microsoft.com/office/drawing/2014/main" id="{5A9D2960-6D42-439F-82E8-812822013A10}"/>
+                <a16:creationId xmlns:a16="http://schemas.microsoft.com/office/drawing/2014/main" id="{5A9D2960-6D42-439F-82E8-812822013A10}"/>
               </a:ext>
             </a:extLst>
           </p:cNvPr>
@@ -6795,7 +6795,7 @@
           <p:cNvPr id="6" name="Title 5">
             <a:extLst>
               <a:ext uri="{FF2B5EF4-FFF2-40B4-BE49-F238E27FC236}">
-                <a16:creationId xmlns="" xmlns:a16="http://schemas.microsoft.com/office/drawing/2014/main" id="{19B5B676-7892-440F-8191-7109B2C59885}"/>
+                <a16:creationId xmlns:a16="http://schemas.microsoft.com/office/drawing/2014/main" id="{19B5B676-7892-440F-8191-7109B2C59885}"/>
               </a:ext>
             </a:extLst>
           </p:cNvPr>
@@ -6831,7 +6831,7 @@
           <p:cNvPr id="2" name="Date Placeholder 1">
             <a:extLst>
               <a:ext uri="{FF2B5EF4-FFF2-40B4-BE49-F238E27FC236}">
-                <a16:creationId xmlns="" xmlns:a16="http://schemas.microsoft.com/office/drawing/2014/main" id="{303E2769-FF5C-435B-BEDD-ABA3B8F1B976}"/>
+                <a16:creationId xmlns:a16="http://schemas.microsoft.com/office/drawing/2014/main" id="{303E2769-FF5C-435B-BEDD-ABA3B8F1B976}"/>
               </a:ext>
             </a:extLst>
           </p:cNvPr>
@@ -6856,7 +6856,7 @@
           <p:cNvPr id="4" name="Footer Placeholder 3">
             <a:extLst>
               <a:ext uri="{FF2B5EF4-FFF2-40B4-BE49-F238E27FC236}">
-                <a16:creationId xmlns="" xmlns:a16="http://schemas.microsoft.com/office/drawing/2014/main" id="{9CB6AD27-58D7-46FA-99F8-E5BB835ADA68}"/>
+                <a16:creationId xmlns:a16="http://schemas.microsoft.com/office/drawing/2014/main" id="{9CB6AD27-58D7-46FA-99F8-E5BB835ADA68}"/>
               </a:ext>
             </a:extLst>
           </p:cNvPr>
@@ -6881,7 +6881,7 @@
           <p:cNvPr id="5" name="Slide Number Placeholder 4">
             <a:extLst>
               <a:ext uri="{FF2B5EF4-FFF2-40B4-BE49-F238E27FC236}">
-                <a16:creationId xmlns="" xmlns:a16="http://schemas.microsoft.com/office/drawing/2014/main" id="{389DA7C9-2FCE-40EB-BF32-C6983222020F}"/>
+                <a16:creationId xmlns:a16="http://schemas.microsoft.com/office/drawing/2014/main" id="{389DA7C9-2FCE-40EB-BF32-C6983222020F}"/>
               </a:ext>
             </a:extLst>
           </p:cNvPr>
@@ -6911,7 +6911,7 @@
           <p:cNvPr id="11" name="Picture 10">
             <a:extLst>
               <a:ext uri="{FF2B5EF4-FFF2-40B4-BE49-F238E27FC236}">
-                <a16:creationId xmlns="" xmlns:a16="http://schemas.microsoft.com/office/drawing/2014/main" id="{0991B60F-461F-45D1-A35C-8AC3D83E7AD8}"/>
+                <a16:creationId xmlns:a16="http://schemas.microsoft.com/office/drawing/2014/main" id="{0991B60F-461F-45D1-A35C-8AC3D83E7AD8}"/>
               </a:ext>
             </a:extLst>
           </p:cNvPr>
@@ -8039,7 +8039,7 @@
           <p:cNvPr id="11" name="Picture 10">
             <a:extLst>
               <a:ext uri="{FF2B5EF4-FFF2-40B4-BE49-F238E27FC236}">
-                <a16:creationId xmlns="" xmlns:a16="http://schemas.microsoft.com/office/drawing/2014/main" id="{C1E40596-5F7F-41C3-9807-7FA635B42492}"/>
+                <a16:creationId xmlns:a16="http://schemas.microsoft.com/office/drawing/2014/main" id="{C1E40596-5F7F-41C3-9807-7FA635B42492}"/>
               </a:ext>
             </a:extLst>
           </p:cNvPr>
@@ -8068,7 +8068,7 @@
           <p:cNvPr id="7" name="Rectangle 6">
             <a:extLst>
               <a:ext uri="{FF2B5EF4-FFF2-40B4-BE49-F238E27FC236}">
-                <a16:creationId xmlns="" xmlns:a16="http://schemas.microsoft.com/office/drawing/2014/main" id="{C5951C9B-3DEE-4E28-8D4C-55505E0CB6AB}"/>
+                <a16:creationId xmlns:a16="http://schemas.microsoft.com/office/drawing/2014/main" id="{C5951C9B-3DEE-4E28-8D4C-55505E0CB6AB}"/>
               </a:ext>
             </a:extLst>
           </p:cNvPr>
@@ -8149,7 +8149,7 @@
           <p:cNvPr id="9" name="Picture 8" descr="A drawing of a cartoon character&#10;&#10;Description generated with high confidence">
             <a:extLst>
               <a:ext uri="{FF2B5EF4-FFF2-40B4-BE49-F238E27FC236}">
-                <a16:creationId xmlns="" xmlns:a16="http://schemas.microsoft.com/office/drawing/2014/main" id="{DC4365F6-D2C1-47B4-8477-38FD2C7711AA}"/>
+                <a16:creationId xmlns:a16="http://schemas.microsoft.com/office/drawing/2014/main" id="{DC4365F6-D2C1-47B4-8477-38FD2C7711AA}"/>
               </a:ext>
             </a:extLst>
           </p:cNvPr>
@@ -8185,7 +8185,7 @@
           <p:cNvPr id="12" name="Title 11">
             <a:extLst>
               <a:ext uri="{FF2B5EF4-FFF2-40B4-BE49-F238E27FC236}">
-                <a16:creationId xmlns="" xmlns:a16="http://schemas.microsoft.com/office/drawing/2014/main" id="{48CCE616-2FC8-4941-8612-3EC8CFD842E0}"/>
+                <a16:creationId xmlns:a16="http://schemas.microsoft.com/office/drawing/2014/main" id="{48CCE616-2FC8-4941-8612-3EC8CFD842E0}"/>
               </a:ext>
             </a:extLst>
           </p:cNvPr>
@@ -8221,7 +8221,7 @@
           <p:cNvPr id="23" name="Text Placeholder 22">
             <a:extLst>
               <a:ext uri="{FF2B5EF4-FFF2-40B4-BE49-F238E27FC236}">
-                <a16:creationId xmlns="" xmlns:a16="http://schemas.microsoft.com/office/drawing/2014/main" id="{889D93F4-ABFA-46BF-8E5D-FE6562ACB20F}"/>
+                <a16:creationId xmlns:a16="http://schemas.microsoft.com/office/drawing/2014/main" id="{889D93F4-ABFA-46BF-8E5D-FE6562ACB20F}"/>
               </a:ext>
             </a:extLst>
           </p:cNvPr>
@@ -8280,7 +8280,7 @@
           <p:cNvPr id="10" name="Picture 9">
             <a:extLst>
               <a:ext uri="{FF2B5EF4-FFF2-40B4-BE49-F238E27FC236}">
-                <a16:creationId xmlns="" xmlns:a16="http://schemas.microsoft.com/office/drawing/2014/main" id="{DF7D6D63-C0D2-4213-B1FA-96890BDE6C03}"/>
+                <a16:creationId xmlns:a16="http://schemas.microsoft.com/office/drawing/2014/main" id="{DF7D6D63-C0D2-4213-B1FA-96890BDE6C03}"/>
               </a:ext>
             </a:extLst>
           </p:cNvPr>
@@ -8316,7 +8316,7 @@
           <p:cNvPr id="14" name="Date Placeholder 13">
             <a:extLst>
               <a:ext uri="{FF2B5EF4-FFF2-40B4-BE49-F238E27FC236}">
-                <a16:creationId xmlns="" xmlns:a16="http://schemas.microsoft.com/office/drawing/2014/main" id="{0AA6AF62-9F6D-4B1C-831C-72AACA29F786}"/>
+                <a16:creationId xmlns:a16="http://schemas.microsoft.com/office/drawing/2014/main" id="{0AA6AF62-9F6D-4B1C-831C-72AACA29F786}"/>
               </a:ext>
             </a:extLst>
           </p:cNvPr>
@@ -8341,7 +8341,7 @@
           <p:cNvPr id="15" name="Footer Placeholder 14">
             <a:extLst>
               <a:ext uri="{FF2B5EF4-FFF2-40B4-BE49-F238E27FC236}">
-                <a16:creationId xmlns="" xmlns:a16="http://schemas.microsoft.com/office/drawing/2014/main" id="{D92A8ED8-1E91-4F87-9AAB-0B939CA64F66}"/>
+                <a16:creationId xmlns:a16="http://schemas.microsoft.com/office/drawing/2014/main" id="{D92A8ED8-1E91-4F87-9AAB-0B939CA64F66}"/>
               </a:ext>
             </a:extLst>
           </p:cNvPr>
@@ -8366,7 +8366,7 @@
           <p:cNvPr id="16" name="Slide Number Placeholder 15">
             <a:extLst>
               <a:ext uri="{FF2B5EF4-FFF2-40B4-BE49-F238E27FC236}">
-                <a16:creationId xmlns="" xmlns:a16="http://schemas.microsoft.com/office/drawing/2014/main" id="{37E4C518-B0B3-4716-AB97-AC8ECA4F7C84}"/>
+                <a16:creationId xmlns:a16="http://schemas.microsoft.com/office/drawing/2014/main" id="{37E4C518-B0B3-4716-AB97-AC8ECA4F7C84}"/>
               </a:ext>
             </a:extLst>
           </p:cNvPr>
@@ -8434,7 +8434,7 @@
           <p:cNvPr id="6" name="Picture 5">
             <a:extLst>
               <a:ext uri="{FF2B5EF4-FFF2-40B4-BE49-F238E27FC236}">
-                <a16:creationId xmlns="" xmlns:a16="http://schemas.microsoft.com/office/drawing/2014/main" id="{455D431A-1BDA-40DB-B7D8-23653331B7C3}"/>
+                <a16:creationId xmlns:a16="http://schemas.microsoft.com/office/drawing/2014/main" id="{455D431A-1BDA-40DB-B7D8-23653331B7C3}"/>
               </a:ext>
             </a:extLst>
           </p:cNvPr>
@@ -8667,7 +8667,7 @@
           <p:cNvPr id="16" name="Picture 15">
             <a:extLst>
               <a:ext uri="{FF2B5EF4-FFF2-40B4-BE49-F238E27FC236}">
-                <a16:creationId xmlns="" xmlns:a16="http://schemas.microsoft.com/office/drawing/2014/main" id="{B0FF4B1E-24EA-407C-BFA6-24CCB6D4409A}"/>
+                <a16:creationId xmlns:a16="http://schemas.microsoft.com/office/drawing/2014/main" id="{B0FF4B1E-24EA-407C-BFA6-24CCB6D4409A}"/>
               </a:ext>
             </a:extLst>
           </p:cNvPr>
@@ -8851,7 +8851,7 @@
           <p:cNvPr id="7" name="Text Placeholder 6">
             <a:extLst>
               <a:ext uri="{FF2B5EF4-FFF2-40B4-BE49-F238E27FC236}">
-                <a16:creationId xmlns="" xmlns:a16="http://schemas.microsoft.com/office/drawing/2014/main" id="{CB4CB13C-66A1-466B-A6C1-B0BABF5CFEC1}"/>
+                <a16:creationId xmlns:a16="http://schemas.microsoft.com/office/drawing/2014/main" id="{CB4CB13C-66A1-466B-A6C1-B0BABF5CFEC1}"/>
               </a:ext>
             </a:extLst>
           </p:cNvPr>
@@ -8950,7 +8950,7 @@
           <p:cNvPr id="12" name="Title 11">
             <a:extLst>
               <a:ext uri="{FF2B5EF4-FFF2-40B4-BE49-F238E27FC236}">
-                <a16:creationId xmlns="" xmlns:a16="http://schemas.microsoft.com/office/drawing/2014/main" id="{4ED30444-7448-455E-ACFD-2D8F93C93971}"/>
+                <a16:creationId xmlns:a16="http://schemas.microsoft.com/office/drawing/2014/main" id="{4ED30444-7448-455E-ACFD-2D8F93C93971}"/>
               </a:ext>
             </a:extLst>
           </p:cNvPr>
@@ -8987,7 +8987,7 @@
           <p:cNvPr id="15" name="Picture 14">
             <a:extLst>
               <a:ext uri="{FF2B5EF4-FFF2-40B4-BE49-F238E27FC236}">
-                <a16:creationId xmlns="" xmlns:a16="http://schemas.microsoft.com/office/drawing/2014/main" id="{00505D47-5EAF-4709-A366-B1437B044AC8}"/>
+                <a16:creationId xmlns:a16="http://schemas.microsoft.com/office/drawing/2014/main" id="{00505D47-5EAF-4709-A366-B1437B044AC8}"/>
               </a:ext>
             </a:extLst>
           </p:cNvPr>
@@ -9023,7 +9023,7 @@
           <p:cNvPr id="8" name="Date Placeholder 7">
             <a:extLst>
               <a:ext uri="{FF2B5EF4-FFF2-40B4-BE49-F238E27FC236}">
-                <a16:creationId xmlns="" xmlns:a16="http://schemas.microsoft.com/office/drawing/2014/main" id="{CF9A2DC4-5280-4E93-B6D2-9709FE6D0627}"/>
+                <a16:creationId xmlns:a16="http://schemas.microsoft.com/office/drawing/2014/main" id="{CF9A2DC4-5280-4E93-B6D2-9709FE6D0627}"/>
               </a:ext>
             </a:extLst>
           </p:cNvPr>
@@ -9048,7 +9048,7 @@
           <p:cNvPr id="10" name="Footer Placeholder 9">
             <a:extLst>
               <a:ext uri="{FF2B5EF4-FFF2-40B4-BE49-F238E27FC236}">
-                <a16:creationId xmlns="" xmlns:a16="http://schemas.microsoft.com/office/drawing/2014/main" id="{FA4C1EE0-8040-49CB-9319-CF991DE7B325}"/>
+                <a16:creationId xmlns:a16="http://schemas.microsoft.com/office/drawing/2014/main" id="{FA4C1EE0-8040-49CB-9319-CF991DE7B325}"/>
               </a:ext>
             </a:extLst>
           </p:cNvPr>
@@ -9073,7 +9073,7 @@
           <p:cNvPr id="17" name="Slide Number Placeholder 16">
             <a:extLst>
               <a:ext uri="{FF2B5EF4-FFF2-40B4-BE49-F238E27FC236}">
-                <a16:creationId xmlns="" xmlns:a16="http://schemas.microsoft.com/office/drawing/2014/main" id="{1643825A-6B67-4224-B077-B526FC2A4C74}"/>
+                <a16:creationId xmlns:a16="http://schemas.microsoft.com/office/drawing/2014/main" id="{1643825A-6B67-4224-B077-B526FC2A4C74}"/>
               </a:ext>
             </a:extLst>
           </p:cNvPr>
@@ -9141,7 +9141,7 @@
           <p:cNvPr id="17" name="Picture 16">
             <a:extLst>
               <a:ext uri="{FF2B5EF4-FFF2-40B4-BE49-F238E27FC236}">
-                <a16:creationId xmlns="" xmlns:a16="http://schemas.microsoft.com/office/drawing/2014/main" id="{3DA6B0AA-1988-451B-88D4-0F726295570B}"/>
+                <a16:creationId xmlns:a16="http://schemas.microsoft.com/office/drawing/2014/main" id="{3DA6B0AA-1988-451B-88D4-0F726295570B}"/>
               </a:ext>
             </a:extLst>
           </p:cNvPr>
@@ -9170,7 +9170,7 @@
           <p:cNvPr id="12" name="Rectangle 11">
             <a:extLst>
               <a:ext uri="{FF2B5EF4-FFF2-40B4-BE49-F238E27FC236}">
-                <a16:creationId xmlns="" xmlns:a16="http://schemas.microsoft.com/office/drawing/2014/main" id="{345FB1C8-7F66-4D5C-ACCE-AE919936BCFD}"/>
+                <a16:creationId xmlns:a16="http://schemas.microsoft.com/office/drawing/2014/main" id="{345FB1C8-7F66-4D5C-ACCE-AE919936BCFD}"/>
               </a:ext>
             </a:extLst>
           </p:cNvPr>
@@ -9292,7 +9292,7 @@
           <p:cNvPr id="13" name="Title 11">
             <a:extLst>
               <a:ext uri="{FF2B5EF4-FFF2-40B4-BE49-F238E27FC236}">
-                <a16:creationId xmlns="" xmlns:a16="http://schemas.microsoft.com/office/drawing/2014/main" id="{0D5CC956-5C4A-44BE-8F8B-327FAFA51E97}"/>
+                <a16:creationId xmlns:a16="http://schemas.microsoft.com/office/drawing/2014/main" id="{0D5CC956-5C4A-44BE-8F8B-327FAFA51E97}"/>
               </a:ext>
             </a:extLst>
           </p:cNvPr>
@@ -9329,7 +9329,7 @@
           <p:cNvPr id="15" name="Text Placeholder 6">
             <a:extLst>
               <a:ext uri="{FF2B5EF4-FFF2-40B4-BE49-F238E27FC236}">
-                <a16:creationId xmlns="" xmlns:a16="http://schemas.microsoft.com/office/drawing/2014/main" id="{6157C8DE-E0AF-422B-BBB1-F0AF1264B5E9}"/>
+                <a16:creationId xmlns:a16="http://schemas.microsoft.com/office/drawing/2014/main" id="{6157C8DE-E0AF-422B-BBB1-F0AF1264B5E9}"/>
               </a:ext>
             </a:extLst>
           </p:cNvPr>
@@ -9428,7 +9428,7 @@
           <p:cNvPr id="2" name="Date Placeholder 1">
             <a:extLst>
               <a:ext uri="{FF2B5EF4-FFF2-40B4-BE49-F238E27FC236}">
-                <a16:creationId xmlns="" xmlns:a16="http://schemas.microsoft.com/office/drawing/2014/main" id="{3FF2A4EF-FDC7-4D65-91A0-D3473057251B}"/>
+                <a16:creationId xmlns:a16="http://schemas.microsoft.com/office/drawing/2014/main" id="{3FF2A4EF-FDC7-4D65-91A0-D3473057251B}"/>
               </a:ext>
             </a:extLst>
           </p:cNvPr>
@@ -9453,7 +9453,7 @@
           <p:cNvPr id="3" name="Footer Placeholder 2">
             <a:extLst>
               <a:ext uri="{FF2B5EF4-FFF2-40B4-BE49-F238E27FC236}">
-                <a16:creationId xmlns="" xmlns:a16="http://schemas.microsoft.com/office/drawing/2014/main" id="{2AD0B15D-022F-4B93-A0E6-6FC062C18AF1}"/>
+                <a16:creationId xmlns:a16="http://schemas.microsoft.com/office/drawing/2014/main" id="{2AD0B15D-022F-4B93-A0E6-6FC062C18AF1}"/>
               </a:ext>
             </a:extLst>
           </p:cNvPr>
@@ -9478,7 +9478,7 @@
           <p:cNvPr id="4" name="Slide Number Placeholder 3">
             <a:extLst>
               <a:ext uri="{FF2B5EF4-FFF2-40B4-BE49-F238E27FC236}">
-                <a16:creationId xmlns="" xmlns:a16="http://schemas.microsoft.com/office/drawing/2014/main" id="{72845B5C-C9D2-4885-BBE1-AE0D4F570CBF}"/>
+                <a16:creationId xmlns:a16="http://schemas.microsoft.com/office/drawing/2014/main" id="{72845B5C-C9D2-4885-BBE1-AE0D4F570CBF}"/>
               </a:ext>
             </a:extLst>
           </p:cNvPr>
@@ -9508,7 +9508,7 @@
           <p:cNvPr id="11" name="Picture 10">
             <a:extLst>
               <a:ext uri="{FF2B5EF4-FFF2-40B4-BE49-F238E27FC236}">
-                <a16:creationId xmlns="" xmlns:a16="http://schemas.microsoft.com/office/drawing/2014/main" id="{A1E6AED5-8603-4881-90EA-963A2A5A2C03}"/>
+                <a16:creationId xmlns:a16="http://schemas.microsoft.com/office/drawing/2014/main" id="{A1E6AED5-8603-4881-90EA-963A2A5A2C03}"/>
               </a:ext>
             </a:extLst>
           </p:cNvPr>
@@ -9582,7 +9582,7 @@
           <p:cNvPr id="10" name="Picture 9">
             <a:extLst>
               <a:ext uri="{FF2B5EF4-FFF2-40B4-BE49-F238E27FC236}">
-                <a16:creationId xmlns="" xmlns:a16="http://schemas.microsoft.com/office/drawing/2014/main" id="{89AD94B5-9922-4E42-89CE-3C445EFB152E}"/>
+                <a16:creationId xmlns:a16="http://schemas.microsoft.com/office/drawing/2014/main" id="{89AD94B5-9922-4E42-89CE-3C445EFB152E}"/>
               </a:ext>
             </a:extLst>
           </p:cNvPr>
@@ -9611,7 +9611,7 @@
           <p:cNvPr id="13" name="Rectangle 12">
             <a:extLst>
               <a:ext uri="{FF2B5EF4-FFF2-40B4-BE49-F238E27FC236}">
-                <a16:creationId xmlns="" xmlns:a16="http://schemas.microsoft.com/office/drawing/2014/main" id="{391AFA4E-7870-4561-A1B8-AC956B0C8931}"/>
+                <a16:creationId xmlns:a16="http://schemas.microsoft.com/office/drawing/2014/main" id="{391AFA4E-7870-4561-A1B8-AC956B0C8931}"/>
               </a:ext>
             </a:extLst>
           </p:cNvPr>
@@ -9692,7 +9692,7 @@
           <p:cNvPr id="3" name="Text Placeholder 2">
             <a:extLst>
               <a:ext uri="{FF2B5EF4-FFF2-40B4-BE49-F238E27FC236}">
-                <a16:creationId xmlns="" xmlns:a16="http://schemas.microsoft.com/office/drawing/2014/main" id="{5A9D2960-6D42-439F-82E8-812822013A10}"/>
+                <a16:creationId xmlns:a16="http://schemas.microsoft.com/office/drawing/2014/main" id="{5A9D2960-6D42-439F-82E8-812822013A10}"/>
               </a:ext>
             </a:extLst>
           </p:cNvPr>
@@ -9755,7 +9755,7 @@
           <p:cNvPr id="6" name="Title 5">
             <a:extLst>
               <a:ext uri="{FF2B5EF4-FFF2-40B4-BE49-F238E27FC236}">
-                <a16:creationId xmlns="" xmlns:a16="http://schemas.microsoft.com/office/drawing/2014/main" id="{19B5B676-7892-440F-8191-7109B2C59885}"/>
+                <a16:creationId xmlns:a16="http://schemas.microsoft.com/office/drawing/2014/main" id="{19B5B676-7892-440F-8191-7109B2C59885}"/>
               </a:ext>
             </a:extLst>
           </p:cNvPr>
@@ -9791,7 +9791,7 @@
           <p:cNvPr id="2" name="Date Placeholder 1">
             <a:extLst>
               <a:ext uri="{FF2B5EF4-FFF2-40B4-BE49-F238E27FC236}">
-                <a16:creationId xmlns="" xmlns:a16="http://schemas.microsoft.com/office/drawing/2014/main" id="{303E2769-FF5C-435B-BEDD-ABA3B8F1B976}"/>
+                <a16:creationId xmlns:a16="http://schemas.microsoft.com/office/drawing/2014/main" id="{303E2769-FF5C-435B-BEDD-ABA3B8F1B976}"/>
               </a:ext>
             </a:extLst>
           </p:cNvPr>
@@ -9816,7 +9816,7 @@
           <p:cNvPr id="4" name="Footer Placeholder 3">
             <a:extLst>
               <a:ext uri="{FF2B5EF4-FFF2-40B4-BE49-F238E27FC236}">
-                <a16:creationId xmlns="" xmlns:a16="http://schemas.microsoft.com/office/drawing/2014/main" id="{9CB6AD27-58D7-46FA-99F8-E5BB835ADA68}"/>
+                <a16:creationId xmlns:a16="http://schemas.microsoft.com/office/drawing/2014/main" id="{9CB6AD27-58D7-46FA-99F8-E5BB835ADA68}"/>
               </a:ext>
             </a:extLst>
           </p:cNvPr>
@@ -9841,7 +9841,7 @@
           <p:cNvPr id="5" name="Slide Number Placeholder 4">
             <a:extLst>
               <a:ext uri="{FF2B5EF4-FFF2-40B4-BE49-F238E27FC236}">
-                <a16:creationId xmlns="" xmlns:a16="http://schemas.microsoft.com/office/drawing/2014/main" id="{389DA7C9-2FCE-40EB-BF32-C6983222020F}"/>
+                <a16:creationId xmlns:a16="http://schemas.microsoft.com/office/drawing/2014/main" id="{389DA7C9-2FCE-40EB-BF32-C6983222020F}"/>
               </a:ext>
             </a:extLst>
           </p:cNvPr>
@@ -9871,7 +9871,7 @@
           <p:cNvPr id="11" name="Picture 10">
             <a:extLst>
               <a:ext uri="{FF2B5EF4-FFF2-40B4-BE49-F238E27FC236}">
-                <a16:creationId xmlns="" xmlns:a16="http://schemas.microsoft.com/office/drawing/2014/main" id="{0991B60F-461F-45D1-A35C-8AC3D83E7AD8}"/>
+                <a16:creationId xmlns:a16="http://schemas.microsoft.com/office/drawing/2014/main" id="{0991B60F-461F-45D1-A35C-8AC3D83E7AD8}"/>
               </a:ext>
             </a:extLst>
           </p:cNvPr>
@@ -10009,7 +10009,7 @@
           <p:cNvPr id="14" name="Picture 13">
             <a:extLst>
               <a:ext uri="{FF2B5EF4-FFF2-40B4-BE49-F238E27FC236}">
-                <a16:creationId xmlns="" xmlns:a16="http://schemas.microsoft.com/office/drawing/2014/main" id="{79D60504-DA9E-4357-9A0A-15E333FC2783}"/>
+                <a16:creationId xmlns:a16="http://schemas.microsoft.com/office/drawing/2014/main" id="{79D60504-DA9E-4357-9A0A-15E333FC2783}"/>
               </a:ext>
             </a:extLst>
           </p:cNvPr>
@@ -10038,7 +10038,7 @@
           <p:cNvPr id="13" name="Rectangle 12">
             <a:extLst>
               <a:ext uri="{FF2B5EF4-FFF2-40B4-BE49-F238E27FC236}">
-                <a16:creationId xmlns="" xmlns:a16="http://schemas.microsoft.com/office/drawing/2014/main" id="{57B03959-5ED4-4593-8CEF-2AE1A73775F5}"/>
+                <a16:creationId xmlns:a16="http://schemas.microsoft.com/office/drawing/2014/main" id="{57B03959-5ED4-4593-8CEF-2AE1A73775F5}"/>
               </a:ext>
             </a:extLst>
           </p:cNvPr>
@@ -10276,7 +10276,7 @@
           <p:cNvPr id="6" name="Title 5">
             <a:extLst>
               <a:ext uri="{FF2B5EF4-FFF2-40B4-BE49-F238E27FC236}">
-                <a16:creationId xmlns="" xmlns:a16="http://schemas.microsoft.com/office/drawing/2014/main" id="{38A09987-8827-47B7-85D3-6D69487FC731}"/>
+                <a16:creationId xmlns:a16="http://schemas.microsoft.com/office/drawing/2014/main" id="{38A09987-8827-47B7-85D3-6D69487FC731}"/>
               </a:ext>
             </a:extLst>
           </p:cNvPr>
@@ -10312,7 +10312,7 @@
           <p:cNvPr id="12" name="Picture 11">
             <a:extLst>
               <a:ext uri="{FF2B5EF4-FFF2-40B4-BE49-F238E27FC236}">
-                <a16:creationId xmlns="" xmlns:a16="http://schemas.microsoft.com/office/drawing/2014/main" id="{7028D2F0-1E67-414B-A93D-D3F8F131A132}"/>
+                <a16:creationId xmlns:a16="http://schemas.microsoft.com/office/drawing/2014/main" id="{7028D2F0-1E67-414B-A93D-D3F8F131A132}"/>
               </a:ext>
             </a:extLst>
           </p:cNvPr>
@@ -10348,7 +10348,7 @@
           <p:cNvPr id="9" name="Text Placeholder 2">
             <a:extLst>
               <a:ext uri="{FF2B5EF4-FFF2-40B4-BE49-F238E27FC236}">
-                <a16:creationId xmlns="" xmlns:a16="http://schemas.microsoft.com/office/drawing/2014/main" id="{C8A626D2-456B-41EF-9818-EA8DD7E314DA}"/>
+                <a16:creationId xmlns:a16="http://schemas.microsoft.com/office/drawing/2014/main" id="{C8A626D2-456B-41EF-9818-EA8DD7E314DA}"/>
               </a:ext>
             </a:extLst>
           </p:cNvPr>
@@ -10411,7 +10411,7 @@
           <p:cNvPr id="10" name="Text Placeholder 2">
             <a:extLst>
               <a:ext uri="{FF2B5EF4-FFF2-40B4-BE49-F238E27FC236}">
-                <a16:creationId xmlns="" xmlns:a16="http://schemas.microsoft.com/office/drawing/2014/main" id="{AF69A59F-C564-4A04-B1CC-31C261499991}"/>
+                <a16:creationId xmlns:a16="http://schemas.microsoft.com/office/drawing/2014/main" id="{AF69A59F-C564-4A04-B1CC-31C261499991}"/>
               </a:ext>
             </a:extLst>
           </p:cNvPr>
@@ -10474,7 +10474,7 @@
           <p:cNvPr id="5" name="Date Placeholder 4">
             <a:extLst>
               <a:ext uri="{FF2B5EF4-FFF2-40B4-BE49-F238E27FC236}">
-                <a16:creationId xmlns="" xmlns:a16="http://schemas.microsoft.com/office/drawing/2014/main" id="{F858E34E-73A2-41B4-8C58-4DDB1D4D97D8}"/>
+                <a16:creationId xmlns:a16="http://schemas.microsoft.com/office/drawing/2014/main" id="{F858E34E-73A2-41B4-8C58-4DDB1D4D97D8}"/>
               </a:ext>
             </a:extLst>
           </p:cNvPr>
@@ -10504,7 +10504,7 @@
           <p:cNvPr id="7" name="Footer Placeholder 6">
             <a:extLst>
               <a:ext uri="{FF2B5EF4-FFF2-40B4-BE49-F238E27FC236}">
-                <a16:creationId xmlns="" xmlns:a16="http://schemas.microsoft.com/office/drawing/2014/main" id="{47141AFF-42FF-4AAA-A3FA-149DDA66FCC2}"/>
+                <a16:creationId xmlns:a16="http://schemas.microsoft.com/office/drawing/2014/main" id="{47141AFF-42FF-4AAA-A3FA-149DDA66FCC2}"/>
               </a:ext>
             </a:extLst>
           </p:cNvPr>
@@ -10529,7 +10529,7 @@
           <p:cNvPr id="8" name="Slide Number Placeholder 7">
             <a:extLst>
               <a:ext uri="{FF2B5EF4-FFF2-40B4-BE49-F238E27FC236}">
-                <a16:creationId xmlns="" xmlns:a16="http://schemas.microsoft.com/office/drawing/2014/main" id="{92B2616D-7BC8-4F96-B3A7-B299A353B427}"/>
+                <a16:creationId xmlns:a16="http://schemas.microsoft.com/office/drawing/2014/main" id="{92B2616D-7BC8-4F96-B3A7-B299A353B427}"/>
               </a:ext>
             </a:extLst>
           </p:cNvPr>
@@ -10567,7 +10567,7 @@
           <p:cNvPr id="15" name="Picture 14">
             <a:extLst>
               <a:ext uri="{FF2B5EF4-FFF2-40B4-BE49-F238E27FC236}">
-                <a16:creationId xmlns="" xmlns:a16="http://schemas.microsoft.com/office/drawing/2014/main" id="{23AACB49-5E4F-4436-9D82-E83B52A7FCB8}"/>
+                <a16:creationId xmlns:a16="http://schemas.microsoft.com/office/drawing/2014/main" id="{23AACB49-5E4F-4436-9D82-E83B52A7FCB8}"/>
               </a:ext>
             </a:extLst>
           </p:cNvPr>
@@ -10618,7 +10618,7 @@
   </mc:AlternateContent>
   <p:extLst mod="1">
     <p:ext uri="{DCECCB84-F9BA-43D5-87BE-67443E8EF086}">
-      <p15:sldGuideLst xmlns:p15="http://schemas.microsoft.com/office/powerpoint/2012/main" xmlns="">
+      <p15:sldGuideLst xmlns:p15="http://schemas.microsoft.com/office/powerpoint/2012/main">
         <p15:guide id="1" orient="horz" pos="2160">
           <p15:clr>
             <a:srgbClr val="FBAE40"/>
@@ -10657,7 +10657,7 @@
           <p:cNvPr id="15" name="Picture 14">
             <a:extLst>
               <a:ext uri="{FF2B5EF4-FFF2-40B4-BE49-F238E27FC236}">
-                <a16:creationId xmlns="" xmlns:a16="http://schemas.microsoft.com/office/drawing/2014/main" id="{C19C6415-13AB-4677-935E-D11508C4AD27}"/>
+                <a16:creationId xmlns:a16="http://schemas.microsoft.com/office/drawing/2014/main" id="{C19C6415-13AB-4677-935E-D11508C4AD27}"/>
               </a:ext>
             </a:extLst>
           </p:cNvPr>
@@ -10686,7 +10686,7 @@
           <p:cNvPr id="13" name="Rectangle 12">
             <a:extLst>
               <a:ext uri="{FF2B5EF4-FFF2-40B4-BE49-F238E27FC236}">
-                <a16:creationId xmlns="" xmlns:a16="http://schemas.microsoft.com/office/drawing/2014/main" id="{4B4EBD86-A13A-41DF-A04E-EA4A858E8860}"/>
+                <a16:creationId xmlns:a16="http://schemas.microsoft.com/office/drawing/2014/main" id="{4B4EBD86-A13A-41DF-A04E-EA4A858E8860}"/>
               </a:ext>
             </a:extLst>
           </p:cNvPr>
@@ -10767,7 +10767,7 @@
           <p:cNvPr id="21" name="Text Placeholder 20">
             <a:extLst>
               <a:ext uri="{FF2B5EF4-FFF2-40B4-BE49-F238E27FC236}">
-                <a16:creationId xmlns="" xmlns:a16="http://schemas.microsoft.com/office/drawing/2014/main" id="{04F318BE-2BAD-4677-871C-D78A4BF0CBA6}"/>
+                <a16:creationId xmlns:a16="http://schemas.microsoft.com/office/drawing/2014/main" id="{04F318BE-2BAD-4677-871C-D78A4BF0CBA6}"/>
               </a:ext>
             </a:extLst>
           </p:cNvPr>
@@ -10815,7 +10815,7 @@
           <p:cNvPr id="6" name="Text Placeholder 5">
             <a:extLst>
               <a:ext uri="{FF2B5EF4-FFF2-40B4-BE49-F238E27FC236}">
-                <a16:creationId xmlns="" xmlns:a16="http://schemas.microsoft.com/office/drawing/2014/main" id="{3278A82F-5546-4977-9F75-2A933B415945}"/>
+                <a16:creationId xmlns:a16="http://schemas.microsoft.com/office/drawing/2014/main" id="{3278A82F-5546-4977-9F75-2A933B415945}"/>
               </a:ext>
             </a:extLst>
           </p:cNvPr>
@@ -10898,7 +10898,7 @@
           <p:cNvPr id="2" name="Title 1">
             <a:extLst>
               <a:ext uri="{FF2B5EF4-FFF2-40B4-BE49-F238E27FC236}">
-                <a16:creationId xmlns="" xmlns:a16="http://schemas.microsoft.com/office/drawing/2014/main" id="{03BA3E62-7E9B-447C-9045-B989874D05D3}"/>
+                <a16:creationId xmlns:a16="http://schemas.microsoft.com/office/drawing/2014/main" id="{03BA3E62-7E9B-447C-9045-B989874D05D3}"/>
               </a:ext>
             </a:extLst>
           </p:cNvPr>
@@ -10934,7 +10934,7 @@
           <p:cNvPr id="3" name="Date Placeholder 2">
             <a:extLst>
               <a:ext uri="{FF2B5EF4-FFF2-40B4-BE49-F238E27FC236}">
-                <a16:creationId xmlns="" xmlns:a16="http://schemas.microsoft.com/office/drawing/2014/main" id="{1557BD22-7B02-4D39-928A-4BAD0D84EC13}"/>
+                <a16:creationId xmlns:a16="http://schemas.microsoft.com/office/drawing/2014/main" id="{1557BD22-7B02-4D39-928A-4BAD0D84EC13}"/>
               </a:ext>
             </a:extLst>
           </p:cNvPr>
@@ -10959,7 +10959,7 @@
           <p:cNvPr id="4" name="Footer Placeholder 3">
             <a:extLst>
               <a:ext uri="{FF2B5EF4-FFF2-40B4-BE49-F238E27FC236}">
-                <a16:creationId xmlns="" xmlns:a16="http://schemas.microsoft.com/office/drawing/2014/main" id="{12DED1B3-84A5-43D8-8770-B2C1E963B681}"/>
+                <a16:creationId xmlns:a16="http://schemas.microsoft.com/office/drawing/2014/main" id="{12DED1B3-84A5-43D8-8770-B2C1E963B681}"/>
               </a:ext>
             </a:extLst>
           </p:cNvPr>
@@ -10984,7 +10984,7 @@
           <p:cNvPr id="5" name="Slide Number Placeholder 4">
             <a:extLst>
               <a:ext uri="{FF2B5EF4-FFF2-40B4-BE49-F238E27FC236}">
-                <a16:creationId xmlns="" xmlns:a16="http://schemas.microsoft.com/office/drawing/2014/main" id="{6213FF9B-335F-4699-94F7-E43CA829037E}"/>
+                <a16:creationId xmlns:a16="http://schemas.microsoft.com/office/drawing/2014/main" id="{6213FF9B-335F-4699-94F7-E43CA829037E}"/>
               </a:ext>
             </a:extLst>
           </p:cNvPr>
@@ -11014,7 +11014,7 @@
           <p:cNvPr id="11" name="Picture 10">
             <a:extLst>
               <a:ext uri="{FF2B5EF4-FFF2-40B4-BE49-F238E27FC236}">
-                <a16:creationId xmlns="" xmlns:a16="http://schemas.microsoft.com/office/drawing/2014/main" id="{2EB003D1-D2F8-474E-9E8E-075BE60E9273}"/>
+                <a16:creationId xmlns:a16="http://schemas.microsoft.com/office/drawing/2014/main" id="{2EB003D1-D2F8-474E-9E8E-075BE60E9273}"/>
               </a:ext>
             </a:extLst>
           </p:cNvPr>
@@ -11096,7 +11096,7 @@
           <p:cNvPr id="7" name="Date Placeholder 3">
             <a:extLst>
               <a:ext uri="{FF2B5EF4-FFF2-40B4-BE49-F238E27FC236}">
-                <a16:creationId xmlns="" xmlns:a16="http://schemas.microsoft.com/office/drawing/2014/main" id="{0403F5F2-BA1B-4A39-A03D-AD9E0469441C}"/>
+                <a16:creationId xmlns:a16="http://schemas.microsoft.com/office/drawing/2014/main" id="{0403F5F2-BA1B-4A39-A03D-AD9E0469441C}"/>
               </a:ext>
             </a:extLst>
           </p:cNvPr>
@@ -11137,7 +11137,7 @@
           <p:cNvPr id="8" name="Footer Placeholder 4">
             <a:extLst>
               <a:ext uri="{FF2B5EF4-FFF2-40B4-BE49-F238E27FC236}">
-                <a16:creationId xmlns="" xmlns:a16="http://schemas.microsoft.com/office/drawing/2014/main" id="{32BCD1B1-3A00-45B1-B516-6B8E7FBC47C4}"/>
+                <a16:creationId xmlns:a16="http://schemas.microsoft.com/office/drawing/2014/main" id="{32BCD1B1-3A00-45B1-B516-6B8E7FBC47C4}"/>
               </a:ext>
             </a:extLst>
           </p:cNvPr>
@@ -11178,7 +11178,7 @@
           <p:cNvPr id="9" name="Slide Number Placeholder 5">
             <a:extLst>
               <a:ext uri="{FF2B5EF4-FFF2-40B4-BE49-F238E27FC236}">
-                <a16:creationId xmlns="" xmlns:a16="http://schemas.microsoft.com/office/drawing/2014/main" id="{0902A4B2-CB08-42CE-A814-FBDF345C2F43}"/>
+                <a16:creationId xmlns:a16="http://schemas.microsoft.com/office/drawing/2014/main" id="{0902A4B2-CB08-42CE-A814-FBDF345C2F43}"/>
               </a:ext>
             </a:extLst>
           </p:cNvPr>
@@ -11224,7 +11224,7 @@
           <p:cNvPr id="10" name="Title Placeholder 1">
             <a:extLst>
               <a:ext uri="{FF2B5EF4-FFF2-40B4-BE49-F238E27FC236}">
-                <a16:creationId xmlns="" xmlns:a16="http://schemas.microsoft.com/office/drawing/2014/main" id="{B770C392-3003-4C35-9625-BB041F8257BA}"/>
+                <a16:creationId xmlns:a16="http://schemas.microsoft.com/office/drawing/2014/main" id="{B770C392-3003-4C35-9625-BB041F8257BA}"/>
               </a:ext>
             </a:extLst>
           </p:cNvPr>
@@ -11263,7 +11263,7 @@
           <p:cNvPr id="11" name="Text Placeholder 2">
             <a:extLst>
               <a:ext uri="{FF2B5EF4-FFF2-40B4-BE49-F238E27FC236}">
-                <a16:creationId xmlns="" xmlns:a16="http://schemas.microsoft.com/office/drawing/2014/main" id="{90CBFB32-9F46-4F2F-8A54-9EE8BED27855}"/>
+                <a16:creationId xmlns:a16="http://schemas.microsoft.com/office/drawing/2014/main" id="{90CBFB32-9F46-4F2F-8A54-9EE8BED27855}"/>
               </a:ext>
             </a:extLst>
           </p:cNvPr>
@@ -11645,7 +11645,7 @@
   </p:txStyles>
   <p:extLst mod="1">
     <p:ext uri="{27BBF7A9-308A-43DC-89C8-2F10F3537804}">
-      <p15:sldGuideLst xmlns:p15="http://schemas.microsoft.com/office/powerpoint/2012/main" xmlns="">
+      <p15:sldGuideLst xmlns:p15="http://schemas.microsoft.com/office/powerpoint/2012/main">
         <p15:guide id="0" orient="horz" pos="2160" userDrawn="1">
           <p15:clr>
             <a:srgbClr val="F26B43"/>
@@ -14747,13 +14747,24 @@
         </p:nvSpPr>
         <p:spPr/>
         <p:txBody>
-          <a:bodyPr/>
+          <a:bodyPr>
+            <a:normAutofit/>
+          </a:bodyPr>
           <a:lstStyle/>
           <a:p>
             <a:r>
               <a:rPr lang="en-US" dirty="0"/>
-              <a:t>Solution: Text from List</a:t>
-            </a:r>
+              <a:t>Solution: Text from </a:t>
+            </a:r>
+            <a:r>
+              <a:rPr lang="en-US" dirty="0" smtClean="0"/>
+              <a:t>List – </a:t>
+            </a:r>
+            <a:r>
+              <a:rPr lang="bg-BG" dirty="0" smtClean="0"/>
+              <a:t>извличане на техт</a:t>
+            </a:r>
+            <a:endParaRPr lang="en-US" dirty="0"/>
           </a:p>
         </p:txBody>
       </p:sp>
@@ -36231,7 +36242,7 @@
           <p:cNvPr id="14" name="Text Placeholder 4">
             <a:extLst>
               <a:ext uri="{FF2B5EF4-FFF2-40B4-BE49-F238E27FC236}">
-                <a16:creationId xmlns="" xmlns:a16="http://schemas.microsoft.com/office/drawing/2014/main" id="{0E49D336-45B6-44D3-97C4-E28F8DEA2022}"/>
+                <a16:creationId xmlns:a16="http://schemas.microsoft.com/office/drawing/2014/main" id="{0E49D336-45B6-44D3-97C4-E28F8DEA2022}"/>
               </a:ext>
             </a:extLst>
           </p:cNvPr>
@@ -36374,7 +36385,7 @@
           <p:cNvPr id="9" name="Group 8">
             <a:extLst>
               <a:ext uri="{FF2B5EF4-FFF2-40B4-BE49-F238E27FC236}">
-                <a16:creationId xmlns="" xmlns:a16="http://schemas.microsoft.com/office/drawing/2014/main" id="{EBAFE522-EB7D-4931-A015-9A7E8A98517D}"/>
+                <a16:creationId xmlns:a16="http://schemas.microsoft.com/office/drawing/2014/main" id="{EBAFE522-EB7D-4931-A015-9A7E8A98517D}"/>
               </a:ext>
             </a:extLst>
           </p:cNvPr>
@@ -36394,7 +36405,7 @@
             <p:cNvPr id="10" name="Rounded Rectangle 10">
               <a:extLst>
                 <a:ext uri="{FF2B5EF4-FFF2-40B4-BE49-F238E27FC236}">
-                  <a16:creationId xmlns="" xmlns:a16="http://schemas.microsoft.com/office/drawing/2014/main" id="{18F78F23-3D09-4B63-8DF9-D49CFBB145EE}"/>
+                  <a16:creationId xmlns:a16="http://schemas.microsoft.com/office/drawing/2014/main" id="{18F78F23-3D09-4B63-8DF9-D49CFBB145EE}"/>
                 </a:ext>
               </a:extLst>
             </p:cNvPr>
@@ -36448,7 +36459,7 @@
             <p:cNvPr id="11" name="Rounded Rectangle 16">
               <a:extLst>
                 <a:ext uri="{FF2B5EF4-FFF2-40B4-BE49-F238E27FC236}">
-                  <a16:creationId xmlns="" xmlns:a16="http://schemas.microsoft.com/office/drawing/2014/main" id="{F12C06CE-2BBE-46C2-B718-813794C58DF9}"/>
+                  <a16:creationId xmlns:a16="http://schemas.microsoft.com/office/drawing/2014/main" id="{F12C06CE-2BBE-46C2-B718-813794C58DF9}"/>
                 </a:ext>
               </a:extLst>
             </p:cNvPr>
@@ -36508,7 +36519,7 @@
             <p:cNvPr id="12" name="Half Frame 11">
               <a:extLst>
                 <a:ext uri="{FF2B5EF4-FFF2-40B4-BE49-F238E27FC236}">
-                  <a16:creationId xmlns="" xmlns:a16="http://schemas.microsoft.com/office/drawing/2014/main" id="{66CDBB1E-AF3C-43FC-9F34-2DD691F81726}"/>
+                  <a16:creationId xmlns:a16="http://schemas.microsoft.com/office/drawing/2014/main" id="{66CDBB1E-AF3C-43FC-9F34-2DD691F81726}"/>
                 </a:ext>
               </a:extLst>
             </p:cNvPr>
@@ -36570,7 +36581,7 @@
           <p:cNvPr id="13" name="Picture 12">
             <a:extLst>
               <a:ext uri="{FF2B5EF4-FFF2-40B4-BE49-F238E27FC236}">
-                <a16:creationId xmlns="" xmlns:a16="http://schemas.microsoft.com/office/drawing/2014/main" id="{CCC3A316-993C-4741-8826-E104F27650A3}"/>
+                <a16:creationId xmlns:a16="http://schemas.microsoft.com/office/drawing/2014/main" id="{CCC3A316-993C-4741-8826-E104F27650A3}"/>
               </a:ext>
             </a:extLst>
           </p:cNvPr>
@@ -36605,7 +36616,7 @@
           <p:cNvPr id="15" name="Content Placeholder 4">
             <a:extLst>
               <a:ext uri="{FF2B5EF4-FFF2-40B4-BE49-F238E27FC236}">
-                <a16:creationId xmlns="" xmlns:a16="http://schemas.microsoft.com/office/drawing/2014/main" id="{373AC257-A0F4-4265-8C0F-3CB5C237A93D}"/>
+                <a16:creationId xmlns:a16="http://schemas.microsoft.com/office/drawing/2014/main" id="{373AC257-A0F4-4265-8C0F-3CB5C237A93D}"/>
               </a:ext>
             </a:extLst>
           </p:cNvPr>
@@ -38826,7 +38837,7 @@
             <a:hlinkClick r:id="rId7"/>
             <a:extLst>
               <a:ext uri="{FF2B5EF4-FFF2-40B4-BE49-F238E27FC236}">
-                <a16:creationId xmlns="" xmlns:a16="http://schemas.microsoft.com/office/drawing/2014/main" id="{FF8B5863-FC71-441D-893C-E681B70BF35C}"/>
+                <a16:creationId xmlns:a16="http://schemas.microsoft.com/office/drawing/2014/main" id="{FF8B5863-FC71-441D-893C-E681B70BF35C}"/>
               </a:ext>
             </a:extLst>
           </p:cNvPr>
@@ -38863,7 +38874,7 @@
             <a:hlinkClick r:id="rId3"/>
             <a:extLst>
               <a:ext uri="{FF2B5EF4-FFF2-40B4-BE49-F238E27FC236}">
-                <a16:creationId xmlns="" xmlns:a16="http://schemas.microsoft.com/office/drawing/2014/main" id="{5AC70220-7037-4082-BB2D-BF1E99F91E0D}"/>
+                <a16:creationId xmlns:a16="http://schemas.microsoft.com/office/drawing/2014/main" id="{5AC70220-7037-4082-BB2D-BF1E99F91E0D}"/>
               </a:ext>
             </a:extLst>
           </p:cNvPr>
@@ -38900,7 +38911,7 @@
             <a:hlinkClick r:id="rId10" tooltip="Software University @ Facebook"/>
             <a:extLst>
               <a:ext uri="{FF2B5EF4-FFF2-40B4-BE49-F238E27FC236}">
-                <a16:creationId xmlns="" xmlns:a16="http://schemas.microsoft.com/office/drawing/2014/main" id="{7DE74804-3B64-4B79-BDD0-3E400F9EC1FD}"/>
+                <a16:creationId xmlns:a16="http://schemas.microsoft.com/office/drawing/2014/main" id="{7DE74804-3B64-4B79-BDD0-3E400F9EC1FD}"/>
               </a:ext>
             </a:extLst>
           </p:cNvPr>
@@ -38947,7 +38958,7 @@
             <a:hlinkClick r:id="rId6" tooltip="Software University Discussion Forum"/>
             <a:extLst>
               <a:ext uri="{FF2B5EF4-FFF2-40B4-BE49-F238E27FC236}">
-                <a16:creationId xmlns="" xmlns:a16="http://schemas.microsoft.com/office/drawing/2014/main" id="{E65F0011-8B8E-4A02-A422-9662ADE13CB5}"/>
+                <a16:creationId xmlns:a16="http://schemas.microsoft.com/office/drawing/2014/main" id="{E65F0011-8B8E-4A02-A422-9662ADE13CB5}"/>
               </a:ext>
             </a:extLst>
           </p:cNvPr>
@@ -44451,7 +44462,7 @@
   <a:extraClrSchemeLst/>
   <a:extLst>
     <a:ext uri="{05A4C25C-085E-4340-85A3-A5531E510DB2}">
-      <thm15:themeFamily xmlns:thm15="http://schemas.microsoft.com/office/thememl/2012/main" xmlns="" name="SoftUni3_1" id="{D61FAD9B-6E74-4E03-BFE4-B363D484F1DA}" vid="{7089C1A3-635B-4B03-A017-DAF10A3A396B}"/>
+      <thm15:themeFamily xmlns:thm15="http://schemas.microsoft.com/office/thememl/2012/main" name="SoftUni3_1" id="{D61FAD9B-6E74-4E03-BFE4-B363D484F1DA}" vid="{7089C1A3-635B-4B03-A017-DAF10A3A396B}"/>
     </a:ext>
   </a:extLst>
 </a:theme>

</xml_diff>